<commit_message>
rough update to polymorphism slides
</commit_message>
<xml_diff>
--- a/slides/On-Campus/13_02_PolymorphicLife.pptx
+++ b/slides/On-Campus/13_02_PolymorphicLife.pptx
@@ -5,17 +5,21 @@
     <p:sldMasterId id="2147483648" r:id="rId1"/>
   </p:sldMasterIdLst>
   <p:notesMasterIdLst>
-    <p:notesMasterId r:id="rId7"/>
+    <p:notesMasterId r:id="rId11"/>
   </p:notesMasterIdLst>
   <p:handoutMasterIdLst>
-    <p:handoutMasterId r:id="rId8"/>
+    <p:handoutMasterId r:id="rId12"/>
   </p:handoutMasterIdLst>
   <p:sldIdLst>
     <p:sldId id="256" r:id="rId2"/>
-    <p:sldId id="257" r:id="rId3"/>
-    <p:sldId id="258" r:id="rId4"/>
-    <p:sldId id="259" r:id="rId5"/>
-    <p:sldId id="260" r:id="rId6"/>
+    <p:sldId id="271" r:id="rId3"/>
+    <p:sldId id="272" r:id="rId4"/>
+    <p:sldId id="257" r:id="rId5"/>
+    <p:sldId id="273" r:id="rId6"/>
+    <p:sldId id="274" r:id="rId7"/>
+    <p:sldId id="259" r:id="rId8"/>
+    <p:sldId id="260" r:id="rId9"/>
+    <p:sldId id="258" r:id="rId10"/>
   </p:sldIdLst>
   <p:sldSz cx="13817600" cy="7772400"/>
   <p:notesSz cx="6858000" cy="9144000"/>
@@ -218,7 +222,7 @@
           <a:p>
             <a:fld id="{4D7E51A5-B478-1E40-8CBB-0DAA8831E99D}" type="datetimeFigureOut">
               <a:rPr lang="en-US" smtClean="0"/>
-              <a:t>4/21/20</a:t>
+              <a:t>11/16/2021</a:t>
             </a:fld>
             <a:endParaRPr lang="en-US"/>
           </a:p>
@@ -383,7 +387,7 @@
           <a:p>
             <a:fld id="{D0ED587F-861E-6740-9643-E3DDAE89B8D6}" type="datetimeFigureOut">
               <a:rPr lang="en-US" smtClean="0"/>
-              <a:t>4/21/20</a:t>
+              <a:t>11/16/2021</a:t>
             </a:fld>
             <a:endParaRPr lang="en-US"/>
           </a:p>
@@ -4010,6 +4014,602 @@
 </p:sldLayout>
 </file>
 
+<file path=ppt/slideLayouts/slideLayout25.xml><?xml version="1.0" encoding="utf-8"?>
+<p:sldLayout xmlns:a="http://schemas.openxmlformats.org/drawingml/2006/main" xmlns:r="http://schemas.openxmlformats.org/officeDocument/2006/relationships" xmlns:p="http://schemas.openxmlformats.org/presentationml/2006/main" matchingName="Title and Content">
+  <p:cSld name="1_Title and Content">
+    <p:spTree>
+      <p:nvGrpSpPr>
+        <p:cNvPr id="1" name="Shape 53"/>
+        <p:cNvGrpSpPr/>
+        <p:nvPr/>
+      </p:nvGrpSpPr>
+      <p:grpSpPr>
+        <a:xfrm>
+          <a:off x="0" y="0"/>
+          <a:ext cx="0" cy="0"/>
+          <a:chOff x="0" y="0"/>
+          <a:chExt cx="0" cy="0"/>
+        </a:xfrm>
+      </p:grpSpPr>
+      <p:grpSp>
+        <p:nvGrpSpPr>
+          <p:cNvPr id="54" name="Google Shape;54;p14"/>
+          <p:cNvGrpSpPr/>
+          <p:nvPr/>
+        </p:nvGrpSpPr>
+        <p:grpSpPr>
+          <a:xfrm>
+            <a:off x="0" y="7372875"/>
+            <a:ext cx="13849756" cy="400074"/>
+            <a:chOff x="0" y="7372350"/>
+            <a:chExt cx="13817700" cy="400053"/>
+          </a:xfrm>
+        </p:grpSpPr>
+        <p:sp>
+          <p:nvSpPr>
+            <p:cNvPr id="55" name="Google Shape;55;p14"/>
+            <p:cNvSpPr/>
+            <p:nvPr/>
+          </p:nvSpPr>
+          <p:spPr>
+            <a:xfrm>
+              <a:off x="0" y="7372350"/>
+              <a:ext cx="13817700" cy="399900"/>
+            </a:xfrm>
+            <a:prstGeom prst="rect">
+              <a:avLst/>
+            </a:prstGeom>
+            <a:solidFill>
+              <a:schemeClr val="dk2"/>
+            </a:solidFill>
+            <a:ln>
+              <a:noFill/>
+            </a:ln>
+          </p:spPr>
+          <p:txBody>
+            <a:bodyPr spcFirstLastPara="1" wrap="square" lIns="60500" tIns="30250" rIns="60500" bIns="30250" anchor="ctr" anchorCtr="0">
+              <a:noAutofit/>
+            </a:bodyPr>
+            <a:lstStyle/>
+            <a:p>
+              <a:pPr marL="0" marR="0" lvl="0" indent="0" algn="ctr" rtl="0">
+                <a:spcBef>
+                  <a:spcPts val="0"/>
+                </a:spcBef>
+                <a:spcAft>
+                  <a:spcPts val="0"/>
+                </a:spcAft>
+                <a:buNone/>
+              </a:pPr>
+              <a:endParaRPr sz="1964" b="0" i="0" u="none" strike="noStrike" cap="none">
+                <a:solidFill>
+                  <a:schemeClr val="lt1"/>
+                </a:solidFill>
+                <a:latin typeface="Arial"/>
+                <a:ea typeface="Arial"/>
+                <a:cs typeface="Arial"/>
+                <a:sym typeface="Arial"/>
+              </a:endParaRPr>
+            </a:p>
+          </p:txBody>
+        </p:sp>
+        <p:pic>
+          <p:nvPicPr>
+            <p:cNvPr id="56" name="Google Shape;56;p14"/>
+            <p:cNvPicPr preferRelativeResize="0"/>
+            <p:nvPr/>
+          </p:nvPicPr>
+          <p:blipFill rotWithShape="1">
+            <a:blip r:embed="rId2">
+              <a:alphaModFix/>
+            </a:blip>
+            <a:srcRect/>
+            <a:stretch/>
+          </p:blipFill>
+          <p:spPr>
+            <a:xfrm>
+              <a:off x="152257" y="7372351"/>
+              <a:ext cx="1788558" cy="400050"/>
+            </a:xfrm>
+            <a:prstGeom prst="rect">
+              <a:avLst/>
+            </a:prstGeom>
+            <a:noFill/>
+            <a:ln>
+              <a:noFill/>
+            </a:ln>
+          </p:spPr>
+        </p:pic>
+        <p:sp>
+          <p:nvSpPr>
+            <p:cNvPr id="57" name="Google Shape;57;p14"/>
+            <p:cNvSpPr/>
+            <p:nvPr/>
+          </p:nvSpPr>
+          <p:spPr>
+            <a:xfrm>
+              <a:off x="0" y="7372351"/>
+              <a:ext cx="13817700" cy="399900"/>
+            </a:xfrm>
+            <a:prstGeom prst="rect">
+              <a:avLst/>
+            </a:prstGeom>
+            <a:solidFill>
+              <a:schemeClr val="dk2"/>
+            </a:solidFill>
+            <a:ln>
+              <a:noFill/>
+            </a:ln>
+          </p:spPr>
+          <p:txBody>
+            <a:bodyPr spcFirstLastPara="1" wrap="square" lIns="60500" tIns="30250" rIns="60500" bIns="30250" anchor="ctr" anchorCtr="0">
+              <a:noAutofit/>
+            </a:bodyPr>
+            <a:lstStyle/>
+            <a:p>
+              <a:pPr marL="0" marR="0" lvl="0" indent="0" algn="ctr" rtl="0">
+                <a:spcBef>
+                  <a:spcPts val="0"/>
+                </a:spcBef>
+                <a:spcAft>
+                  <a:spcPts val="0"/>
+                </a:spcAft>
+                <a:buNone/>
+              </a:pPr>
+              <a:endParaRPr sz="1964" b="0" i="0" u="none" strike="noStrike" cap="none">
+                <a:solidFill>
+                  <a:schemeClr val="lt1"/>
+                </a:solidFill>
+                <a:latin typeface="Arial"/>
+                <a:ea typeface="Arial"/>
+                <a:cs typeface="Arial"/>
+                <a:sym typeface="Arial"/>
+              </a:endParaRPr>
+            </a:p>
+          </p:txBody>
+        </p:sp>
+        <p:pic>
+          <p:nvPicPr>
+            <p:cNvPr id="58" name="Google Shape;58;p14"/>
+            <p:cNvPicPr preferRelativeResize="0"/>
+            <p:nvPr/>
+          </p:nvPicPr>
+          <p:blipFill rotWithShape="1">
+            <a:blip r:embed="rId2">
+              <a:alphaModFix/>
+            </a:blip>
+            <a:srcRect/>
+            <a:stretch/>
+          </p:blipFill>
+          <p:spPr>
+            <a:xfrm>
+              <a:off x="152257" y="7372352"/>
+              <a:ext cx="1788558" cy="400050"/>
+            </a:xfrm>
+            <a:prstGeom prst="rect">
+              <a:avLst/>
+            </a:prstGeom>
+            <a:noFill/>
+            <a:ln>
+              <a:noFill/>
+            </a:ln>
+          </p:spPr>
+        </p:pic>
+      </p:grpSp>
+      <p:sp>
+        <p:nvSpPr>
+          <p:cNvPr id="59" name="Google Shape;59;p14"/>
+          <p:cNvSpPr txBox="1">
+            <a:spLocks noGrp="1"/>
+          </p:cNvSpPr>
+          <p:nvPr>
+            <p:ph type="title"/>
+          </p:nvPr>
+        </p:nvSpPr>
+        <p:spPr>
+          <a:xfrm>
+            <a:off x="628075" y="905258"/>
+            <a:ext cx="12561413" cy="1015467"/>
+          </a:xfrm>
+          <a:prstGeom prst="rect">
+            <a:avLst/>
+          </a:prstGeom>
+          <a:noFill/>
+          <a:ln>
+            <a:noFill/>
+          </a:ln>
+        </p:spPr>
+        <p:txBody>
+          <a:bodyPr spcFirstLastPara="1" wrap="square" lIns="60500" tIns="60500" rIns="60500" bIns="60500" anchor="b" anchorCtr="0">
+            <a:noAutofit/>
+          </a:bodyPr>
+          <a:lstStyle>
+            <a:lvl1pPr marR="0" lvl="0" algn="l" rtl="0">
+              <a:spcBef>
+                <a:spcPts val="0"/>
+              </a:spcBef>
+              <a:spcAft>
+                <a:spcPts val="0"/>
+              </a:spcAft>
+              <a:buClr>
+                <a:schemeClr val="dk2"/>
+              </a:buClr>
+              <a:buSzPts val="3600"/>
+              <a:buFont typeface="Arial"/>
+              <a:buNone/>
+              <a:defRPr sz="5440" b="0" i="0" u="none" strike="noStrike" cap="none">
+                <a:solidFill>
+                  <a:schemeClr val="dk2"/>
+                </a:solidFill>
+                <a:latin typeface="Arial"/>
+                <a:ea typeface="Arial"/>
+                <a:cs typeface="Arial"/>
+                <a:sym typeface="Arial"/>
+              </a:defRPr>
+            </a:lvl1pPr>
+            <a:lvl2pPr lvl="1" rtl="0">
+              <a:spcBef>
+                <a:spcPts val="0"/>
+              </a:spcBef>
+              <a:spcAft>
+                <a:spcPts val="0"/>
+              </a:spcAft>
+              <a:buSzPts val="900"/>
+              <a:buNone/>
+              <a:defRPr sz="1813"/>
+            </a:lvl2pPr>
+            <a:lvl3pPr lvl="2" rtl="0">
+              <a:spcBef>
+                <a:spcPts val="0"/>
+              </a:spcBef>
+              <a:spcAft>
+                <a:spcPts val="0"/>
+              </a:spcAft>
+              <a:buSzPts val="900"/>
+              <a:buNone/>
+              <a:defRPr sz="1813"/>
+            </a:lvl3pPr>
+            <a:lvl4pPr lvl="3" rtl="0">
+              <a:spcBef>
+                <a:spcPts val="0"/>
+              </a:spcBef>
+              <a:spcAft>
+                <a:spcPts val="0"/>
+              </a:spcAft>
+              <a:buSzPts val="900"/>
+              <a:buNone/>
+              <a:defRPr sz="1813"/>
+            </a:lvl4pPr>
+            <a:lvl5pPr lvl="4" rtl="0">
+              <a:spcBef>
+                <a:spcPts val="0"/>
+              </a:spcBef>
+              <a:spcAft>
+                <a:spcPts val="0"/>
+              </a:spcAft>
+              <a:buSzPts val="900"/>
+              <a:buNone/>
+              <a:defRPr sz="1813"/>
+            </a:lvl5pPr>
+            <a:lvl6pPr lvl="5" rtl="0">
+              <a:spcBef>
+                <a:spcPts val="0"/>
+              </a:spcBef>
+              <a:spcAft>
+                <a:spcPts val="0"/>
+              </a:spcAft>
+              <a:buSzPts val="900"/>
+              <a:buNone/>
+              <a:defRPr sz="1813"/>
+            </a:lvl6pPr>
+            <a:lvl7pPr lvl="6" rtl="0">
+              <a:spcBef>
+                <a:spcPts val="0"/>
+              </a:spcBef>
+              <a:spcAft>
+                <a:spcPts val="0"/>
+              </a:spcAft>
+              <a:buSzPts val="900"/>
+              <a:buNone/>
+              <a:defRPr sz="1813"/>
+            </a:lvl7pPr>
+            <a:lvl8pPr lvl="7" rtl="0">
+              <a:spcBef>
+                <a:spcPts val="0"/>
+              </a:spcBef>
+              <a:spcAft>
+                <a:spcPts val="0"/>
+              </a:spcAft>
+              <a:buSzPts val="900"/>
+              <a:buNone/>
+              <a:defRPr sz="1813"/>
+            </a:lvl8pPr>
+            <a:lvl9pPr lvl="8" rtl="0">
+              <a:spcBef>
+                <a:spcPts val="0"/>
+              </a:spcBef>
+              <a:spcAft>
+                <a:spcPts val="0"/>
+              </a:spcAft>
+              <a:buSzPts val="900"/>
+              <a:buNone/>
+              <a:defRPr sz="1813"/>
+            </a:lvl9pPr>
+          </a:lstStyle>
+          <a:p>
+            <a:endParaRPr/>
+          </a:p>
+        </p:txBody>
+      </p:sp>
+      <p:sp>
+        <p:nvSpPr>
+          <p:cNvPr id="60" name="Google Shape;60;p14"/>
+          <p:cNvSpPr txBox="1">
+            <a:spLocks noGrp="1"/>
+          </p:cNvSpPr>
+          <p:nvPr>
+            <p:ph type="body" idx="1"/>
+          </p:nvPr>
+        </p:nvSpPr>
+        <p:spPr>
+          <a:xfrm>
+            <a:off x="628075" y="2487883"/>
+            <a:ext cx="12561413" cy="2015520"/>
+          </a:xfrm>
+          <a:prstGeom prst="rect">
+            <a:avLst/>
+          </a:prstGeom>
+          <a:noFill/>
+          <a:ln>
+            <a:noFill/>
+          </a:ln>
+        </p:spPr>
+        <p:txBody>
+          <a:bodyPr spcFirstLastPara="1" wrap="square" lIns="60500" tIns="60500" rIns="60500" bIns="60500" anchor="t" anchorCtr="0">
+            <a:noAutofit/>
+          </a:bodyPr>
+          <a:lstStyle>
+            <a:lvl1pPr marL="690875" marR="0" lvl="0" indent="-460583" algn="l" rtl="0">
+              <a:lnSpc>
+                <a:spcPct val="120000"/>
+              </a:lnSpc>
+              <a:spcBef>
+                <a:spcPts val="604"/>
+              </a:spcBef>
+              <a:spcAft>
+                <a:spcPts val="0"/>
+              </a:spcAft>
+              <a:buClr>
+                <a:schemeClr val="dk1"/>
+              </a:buClr>
+              <a:buSzPts val="1200"/>
+              <a:buFont typeface="Arial"/>
+              <a:buChar char="•"/>
+              <a:defRPr sz="1813" b="0" i="0" u="none" strike="noStrike" cap="none">
+                <a:solidFill>
+                  <a:schemeClr val="dk1"/>
+                </a:solidFill>
+                <a:latin typeface="Proxima Nova"/>
+                <a:ea typeface="Proxima Nova"/>
+                <a:cs typeface="Proxima Nova"/>
+                <a:sym typeface="Proxima Nova"/>
+              </a:defRPr>
+            </a:lvl1pPr>
+            <a:lvl2pPr marL="1381750" marR="0" lvl="1" indent="-450988" algn="l" rtl="0">
+              <a:lnSpc>
+                <a:spcPct val="120000"/>
+              </a:lnSpc>
+              <a:spcBef>
+                <a:spcPts val="604"/>
+              </a:spcBef>
+              <a:spcAft>
+                <a:spcPts val="0"/>
+              </a:spcAft>
+              <a:buClr>
+                <a:schemeClr val="dk1"/>
+              </a:buClr>
+              <a:buSzPts val="1100"/>
+              <a:buFont typeface="Arial"/>
+              <a:buChar char="–"/>
+              <a:defRPr sz="1662" b="0" i="0" u="none" strike="noStrike" cap="none">
+                <a:solidFill>
+                  <a:schemeClr val="dk1"/>
+                </a:solidFill>
+                <a:latin typeface="Proxima Nova"/>
+                <a:ea typeface="Proxima Nova"/>
+                <a:cs typeface="Proxima Nova"/>
+                <a:sym typeface="Proxima Nova"/>
+              </a:defRPr>
+            </a:lvl2pPr>
+            <a:lvl3pPr marL="2072625" marR="0" lvl="2" indent="-450988" algn="l" rtl="0">
+              <a:lnSpc>
+                <a:spcPct val="120000"/>
+              </a:lnSpc>
+              <a:spcBef>
+                <a:spcPts val="604"/>
+              </a:spcBef>
+              <a:spcAft>
+                <a:spcPts val="0"/>
+              </a:spcAft>
+              <a:buClr>
+                <a:schemeClr val="dk1"/>
+              </a:buClr>
+              <a:buSzPts val="1100"/>
+              <a:buFont typeface="Arial"/>
+              <a:buChar char="•"/>
+              <a:defRPr sz="1662" b="0" i="0" u="none" strike="noStrike" cap="none">
+                <a:solidFill>
+                  <a:schemeClr val="dk1"/>
+                </a:solidFill>
+                <a:latin typeface="Proxima Nova"/>
+                <a:ea typeface="Proxima Nova"/>
+                <a:cs typeface="Proxima Nova"/>
+                <a:sym typeface="Proxima Nova"/>
+              </a:defRPr>
+            </a:lvl3pPr>
+            <a:lvl4pPr marL="2763500" marR="0" lvl="3" indent="-450988" algn="l" rtl="0">
+              <a:lnSpc>
+                <a:spcPct val="120000"/>
+              </a:lnSpc>
+              <a:spcBef>
+                <a:spcPts val="604"/>
+              </a:spcBef>
+              <a:spcAft>
+                <a:spcPts val="0"/>
+              </a:spcAft>
+              <a:buClr>
+                <a:schemeClr val="dk1"/>
+              </a:buClr>
+              <a:buSzPts val="1100"/>
+              <a:buFont typeface="Arial"/>
+              <a:buChar char="–"/>
+              <a:defRPr sz="1662" b="0" i="0" u="none" strike="noStrike" cap="none">
+                <a:solidFill>
+                  <a:schemeClr val="dk1"/>
+                </a:solidFill>
+                <a:latin typeface="Proxima Nova"/>
+                <a:ea typeface="Proxima Nova"/>
+                <a:cs typeface="Proxima Nova"/>
+                <a:sym typeface="Proxima Nova"/>
+              </a:defRPr>
+            </a:lvl4pPr>
+            <a:lvl5pPr marL="3454375" marR="0" lvl="4" indent="-450988" algn="l" rtl="0">
+              <a:spcBef>
+                <a:spcPts val="604"/>
+              </a:spcBef>
+              <a:spcAft>
+                <a:spcPts val="0"/>
+              </a:spcAft>
+              <a:buClr>
+                <a:schemeClr val="dk1"/>
+              </a:buClr>
+              <a:buSzPts val="1100"/>
+              <a:buFont typeface="Arial"/>
+              <a:buChar char="»"/>
+              <a:defRPr sz="1662" b="0" i="0" u="none" strike="noStrike" cap="none">
+                <a:solidFill>
+                  <a:schemeClr val="dk1"/>
+                </a:solidFill>
+                <a:latin typeface="Source Sans Pro"/>
+                <a:ea typeface="Source Sans Pro"/>
+                <a:cs typeface="Source Sans Pro"/>
+                <a:sym typeface="Source Sans Pro"/>
+              </a:defRPr>
+            </a:lvl5pPr>
+            <a:lvl6pPr marL="4145250" marR="0" lvl="5" indent="-537347" algn="l" rtl="0">
+              <a:spcBef>
+                <a:spcPts val="604"/>
+              </a:spcBef>
+              <a:spcAft>
+                <a:spcPts val="0"/>
+              </a:spcAft>
+              <a:buClr>
+                <a:schemeClr val="dk1"/>
+              </a:buClr>
+              <a:buSzPts val="2000"/>
+              <a:buFont typeface="Arial"/>
+              <a:buChar char="•"/>
+              <a:defRPr sz="3022" b="0" i="0" u="none" strike="noStrike" cap="none">
+                <a:solidFill>
+                  <a:schemeClr val="dk1"/>
+                </a:solidFill>
+                <a:latin typeface="Arial"/>
+                <a:ea typeface="Arial"/>
+                <a:cs typeface="Arial"/>
+                <a:sym typeface="Arial"/>
+              </a:defRPr>
+            </a:lvl6pPr>
+            <a:lvl7pPr marL="4836124" marR="0" lvl="6" indent="-537347" algn="l" rtl="0">
+              <a:spcBef>
+                <a:spcPts val="604"/>
+              </a:spcBef>
+              <a:spcAft>
+                <a:spcPts val="0"/>
+              </a:spcAft>
+              <a:buClr>
+                <a:schemeClr val="dk1"/>
+              </a:buClr>
+              <a:buSzPts val="2000"/>
+              <a:buFont typeface="Arial"/>
+              <a:buChar char="•"/>
+              <a:defRPr sz="3022" b="0" i="0" u="none" strike="noStrike" cap="none">
+                <a:solidFill>
+                  <a:schemeClr val="dk1"/>
+                </a:solidFill>
+                <a:latin typeface="Arial"/>
+                <a:ea typeface="Arial"/>
+                <a:cs typeface="Arial"/>
+                <a:sym typeface="Arial"/>
+              </a:defRPr>
+            </a:lvl7pPr>
+            <a:lvl8pPr marL="5526999" marR="0" lvl="7" indent="-537347" algn="l" rtl="0">
+              <a:spcBef>
+                <a:spcPts val="604"/>
+              </a:spcBef>
+              <a:spcAft>
+                <a:spcPts val="0"/>
+              </a:spcAft>
+              <a:buClr>
+                <a:schemeClr val="dk1"/>
+              </a:buClr>
+              <a:buSzPts val="2000"/>
+              <a:buFont typeface="Arial"/>
+              <a:buChar char="•"/>
+              <a:defRPr sz="3022" b="0" i="0" u="none" strike="noStrike" cap="none">
+                <a:solidFill>
+                  <a:schemeClr val="dk1"/>
+                </a:solidFill>
+                <a:latin typeface="Arial"/>
+                <a:ea typeface="Arial"/>
+                <a:cs typeface="Arial"/>
+                <a:sym typeface="Arial"/>
+              </a:defRPr>
+            </a:lvl8pPr>
+            <a:lvl9pPr marL="6217874" marR="0" lvl="8" indent="-537347" algn="l" rtl="0">
+              <a:spcBef>
+                <a:spcPts val="604"/>
+              </a:spcBef>
+              <a:spcAft>
+                <a:spcPts val="0"/>
+              </a:spcAft>
+              <a:buClr>
+                <a:schemeClr val="dk1"/>
+              </a:buClr>
+              <a:buSzPts val="2000"/>
+              <a:buFont typeface="Arial"/>
+              <a:buChar char="•"/>
+              <a:defRPr sz="3022" b="0" i="0" u="none" strike="noStrike" cap="none">
+                <a:solidFill>
+                  <a:schemeClr val="dk1"/>
+                </a:solidFill>
+                <a:latin typeface="Arial"/>
+                <a:ea typeface="Arial"/>
+                <a:cs typeface="Arial"/>
+                <a:sym typeface="Arial"/>
+              </a:defRPr>
+            </a:lvl9pPr>
+          </a:lstStyle>
+          <a:p>
+            <a:endParaRPr/>
+          </a:p>
+        </p:txBody>
+      </p:sp>
+    </p:spTree>
+    <p:extLst>
+      <p:ext uri="{BB962C8B-B14F-4D97-AF65-F5344CB8AC3E}">
+        <p14:creationId xmlns:p14="http://schemas.microsoft.com/office/powerpoint/2010/main" val="3663185825"/>
+      </p:ext>
+    </p:extLst>
+  </p:cSld>
+  <p:clrMapOvr>
+    <a:masterClrMapping/>
+  </p:clrMapOvr>
+  <p:transition>
+    <p:fade/>
+  </p:transition>
+</p:sldLayout>
+</file>
+
 <file path=ppt/slideLayouts/slideLayout3.xml><?xml version="1.0" encoding="utf-8"?>
 <p:sldLayout xmlns:a="http://schemas.openxmlformats.org/drawingml/2006/main" xmlns:r="http://schemas.openxmlformats.org/officeDocument/2006/relationships" xmlns:p="http://schemas.openxmlformats.org/presentationml/2006/main" preserve="1" userDrawn="1">
   <p:cSld name="Title Green Ram CSU">
@@ -6315,6 +6915,7 @@
     <p:sldLayoutId id="2147483677" r:id="rId22"/>
     <p:sldLayoutId id="2147483692" r:id="rId23"/>
     <p:sldLayoutId id="2147483672" r:id="rId24"/>
+    <p:sldLayoutId id="2147483693" r:id="rId25"/>
   </p:sldLayoutIdLst>
   <mc:AlternateContent xmlns:mc="http://schemas.openxmlformats.org/markup-compatibility/2006" xmlns:p14="http://schemas.microsoft.com/office/powerpoint/2010/main">
     <mc:Choice Requires="p14">
@@ -6729,6 +7330,1556 @@
           <p:cNvPr id="4" name="Title 3">
             <a:extLst>
               <a:ext uri="{FF2B5EF4-FFF2-40B4-BE49-F238E27FC236}">
+                <a16:creationId xmlns:a16="http://schemas.microsoft.com/office/drawing/2014/main" id="{119AD8F2-D5DB-A84B-A5B3-F7935E3E6D1D}"/>
+              </a:ext>
+            </a:extLst>
+          </p:cNvPr>
+          <p:cNvSpPr>
+            <a:spLocks noGrp="1"/>
+          </p:cNvSpPr>
+          <p:nvPr>
+            <p:ph type="title"/>
+          </p:nvPr>
+        </p:nvSpPr>
+        <p:spPr>
+          <a:xfrm>
+            <a:off x="628076" y="607804"/>
+            <a:ext cx="5642096" cy="916848"/>
+          </a:xfrm>
+        </p:spPr>
+        <p:txBody>
+          <a:bodyPr/>
+          <a:lstStyle/>
+          <a:p>
+            <a:r>
+              <a:rPr lang="en-US" dirty="0"/>
+              <a:t>Announcements</a:t>
+            </a:r>
+          </a:p>
+        </p:txBody>
+      </p:sp>
+      <p:sp>
+        <p:nvSpPr>
+          <p:cNvPr id="5" name="Text Placeholder 4">
+            <a:extLst>
+              <a:ext uri="{FF2B5EF4-FFF2-40B4-BE49-F238E27FC236}">
+                <a16:creationId xmlns:a16="http://schemas.microsoft.com/office/drawing/2014/main" id="{1BBD0DB5-379A-304F-9307-E7B1A89B08F7}"/>
+              </a:ext>
+            </a:extLst>
+          </p:cNvPr>
+          <p:cNvSpPr>
+            <a:spLocks noGrp="1"/>
+          </p:cNvSpPr>
+          <p:nvPr>
+            <p:ph type="body" idx="1"/>
+          </p:nvPr>
+        </p:nvSpPr>
+        <p:spPr>
+          <a:xfrm>
+            <a:off x="628076" y="1826093"/>
+            <a:ext cx="8704610" cy="3142551"/>
+          </a:xfrm>
+        </p:spPr>
+        <p:txBody>
+          <a:bodyPr/>
+          <a:lstStyle/>
+          <a:p>
+            <a:r>
+              <a:rPr lang="en-US" dirty="0"/>
+              <a:t>Monday Help Session in CSB 315</a:t>
+            </a:r>
+          </a:p>
+          <a:p>
+            <a:r>
+              <a:rPr lang="en-US" dirty="0"/>
+              <a:t>Make sure to read this week’s announcement </a:t>
+            </a:r>
+          </a:p>
+          <a:p>
+            <a:pPr lvl="1"/>
+            <a:r>
+              <a:rPr lang="en-US" dirty="0"/>
+              <a:t>Come see me during office hours</a:t>
+            </a:r>
+          </a:p>
+          <a:p>
+            <a:r>
+              <a:rPr lang="en-US" dirty="0"/>
+              <a:t> </a:t>
+            </a:r>
+          </a:p>
+        </p:txBody>
+      </p:sp>
+      <p:sp>
+        <p:nvSpPr>
+          <p:cNvPr id="6" name="TextBox 5">
+            <a:extLst>
+              <a:ext uri="{FF2B5EF4-FFF2-40B4-BE49-F238E27FC236}">
+                <a16:creationId xmlns:a16="http://schemas.microsoft.com/office/drawing/2014/main" id="{32A3B87A-BBC0-704B-AC99-3984206450D5}"/>
+              </a:ext>
+            </a:extLst>
+          </p:cNvPr>
+          <p:cNvSpPr txBox="1"/>
+          <p:nvPr/>
+        </p:nvSpPr>
+        <p:spPr>
+          <a:xfrm>
+            <a:off x="9634356" y="1660010"/>
+            <a:ext cx="3892958" cy="1952586"/>
+          </a:xfrm>
+          <a:prstGeom prst="rect">
+            <a:avLst/>
+          </a:prstGeom>
+          <a:noFill/>
+        </p:spPr>
+        <p:txBody>
+          <a:bodyPr wrap="square" rtlCol="0">
+            <a:spAutoFit/>
+          </a:bodyPr>
+          <a:lstStyle/>
+          <a:p>
+            <a:r>
+              <a:rPr lang="en-US" sz="3022" dirty="0" err="1"/>
+              <a:t>Todo</a:t>
+            </a:r>
+            <a:r>
+              <a:rPr lang="en-US" sz="3022" dirty="0"/>
+              <a:t>:</a:t>
+            </a:r>
+          </a:p>
+          <a:p>
+            <a:r>
+              <a:rPr lang="en-US" sz="3022" dirty="0"/>
+              <a:t>Labs this week </a:t>
+            </a:r>
+          </a:p>
+          <a:p>
+            <a:endParaRPr lang="en-US" sz="3022" dirty="0"/>
+          </a:p>
+          <a:p>
+            <a:r>
+              <a:rPr lang="en-US" sz="3022" dirty="0"/>
+              <a:t>Work on Practical 5</a:t>
+            </a:r>
+          </a:p>
+        </p:txBody>
+      </p:sp>
+      <p:sp>
+        <p:nvSpPr>
+          <p:cNvPr id="7" name="TextBox 6">
+            <a:extLst>
+              <a:ext uri="{FF2B5EF4-FFF2-40B4-BE49-F238E27FC236}">
+                <a16:creationId xmlns:a16="http://schemas.microsoft.com/office/drawing/2014/main" id="{BF16D510-BC74-4FA5-AFD2-193B039115A5}"/>
+              </a:ext>
+            </a:extLst>
+          </p:cNvPr>
+          <p:cNvSpPr txBox="1"/>
+          <p:nvPr/>
+        </p:nvSpPr>
+        <p:spPr>
+          <a:xfrm>
+            <a:off x="7228114" y="362857"/>
+            <a:ext cx="6125029" cy="1015663"/>
+          </a:xfrm>
+          <a:prstGeom prst="rect">
+            <a:avLst/>
+          </a:prstGeom>
+          <a:solidFill>
+            <a:schemeClr val="accent2"/>
+          </a:solidFill>
+        </p:spPr>
+        <p:txBody>
+          <a:bodyPr wrap="square" rtlCol="0">
+            <a:spAutoFit/>
+          </a:bodyPr>
+          <a:lstStyle/>
+          <a:p>
+            <a:r>
+              <a:rPr lang="en-US" b="1" dirty="0"/>
+              <a:t>Opening Question: </a:t>
+            </a:r>
+          </a:p>
+          <a:p>
+            <a:r>
+              <a:rPr lang="en-US" dirty="0"/>
+              <a:t>What are we saying when we say List&lt;Object&gt; list = new </a:t>
+            </a:r>
+            <a:r>
+              <a:rPr lang="en-US" dirty="0" err="1"/>
+              <a:t>ArrayList</a:t>
+            </a:r>
+            <a:r>
+              <a:rPr lang="en-US" dirty="0"/>
+              <a:t>&lt;&gt;();</a:t>
+            </a:r>
+          </a:p>
+        </p:txBody>
+      </p:sp>
+      <p:sp>
+        <p:nvSpPr>
+          <p:cNvPr id="8" name="TextBox 7">
+            <a:extLst>
+              <a:ext uri="{FF2B5EF4-FFF2-40B4-BE49-F238E27FC236}">
+                <a16:creationId xmlns:a16="http://schemas.microsoft.com/office/drawing/2014/main" id="{BAB4692C-71C9-4BC4-AAC6-FCD7E7C27E03}"/>
+              </a:ext>
+            </a:extLst>
+          </p:cNvPr>
+          <p:cNvSpPr txBox="1"/>
+          <p:nvPr/>
+        </p:nvSpPr>
+        <p:spPr>
+          <a:xfrm>
+            <a:off x="1469903" y="5591807"/>
+            <a:ext cx="12057411" cy="1754326"/>
+          </a:xfrm>
+          <a:prstGeom prst="rect">
+            <a:avLst/>
+          </a:prstGeom>
+          <a:noFill/>
+          <a:ln>
+            <a:solidFill>
+              <a:schemeClr val="accent5"/>
+            </a:solidFill>
+          </a:ln>
+        </p:spPr>
+        <p:txBody>
+          <a:bodyPr wrap="square">
+            <a:spAutoFit/>
+          </a:bodyPr>
+          <a:lstStyle/>
+          <a:p>
+            <a:r>
+              <a:rPr lang="en-US" sz="1800" dirty="0"/>
+              <a:t>CS 165 – Next Course In Sequence (also 201 is popular with 165)</a:t>
+            </a:r>
+          </a:p>
+          <a:p>
+            <a:pPr marL="342900" indent="-342900">
+              <a:buFont typeface="Arial" panose="020B0604020202020204" pitchFamily="34" charset="0"/>
+              <a:buChar char="•"/>
+            </a:pPr>
+            <a:r>
+              <a:rPr lang="en-US" sz="1800" dirty="0"/>
+              <a:t>CO Jobs Report 2021 – 77% of *all* new jobs in Colorado require programming</a:t>
+            </a:r>
+          </a:p>
+          <a:p>
+            <a:pPr marL="342900" indent="-342900">
+              <a:buFont typeface="Arial" panose="020B0604020202020204" pitchFamily="34" charset="0"/>
+              <a:buChar char="•"/>
+            </a:pPr>
+            <a:r>
+              <a:rPr lang="en-US" sz="1800" dirty="0"/>
+              <a:t>60% of all STEM jobs requires *advanced* (200-300 level) </a:t>
+            </a:r>
+          </a:p>
+          <a:p>
+            <a:pPr marL="342900" indent="-342900">
+              <a:buFont typeface="Arial" panose="020B0604020202020204" pitchFamily="34" charset="0"/>
+              <a:buChar char="•"/>
+            </a:pPr>
+            <a:r>
+              <a:rPr lang="en-US" sz="1800" dirty="0"/>
+              <a:t>31% of all Bachelor of Arts degree titled jobs also required coding skills </a:t>
+            </a:r>
+          </a:p>
+          <a:p>
+            <a:pPr marL="342900" indent="-342900">
+              <a:buFont typeface="Arial" panose="020B0604020202020204" pitchFamily="34" charset="0"/>
+              <a:buChar char="•"/>
+            </a:pPr>
+            <a:r>
+              <a:rPr lang="en-US" sz="1800" dirty="0"/>
+              <a:t>2016 Report found on average jobs that require coding skills paid $22,000 more</a:t>
+            </a:r>
+          </a:p>
+          <a:p>
+            <a:pPr marL="342900" indent="-342900">
+              <a:buFont typeface="Arial" panose="020B0604020202020204" pitchFamily="34" charset="0"/>
+              <a:buChar char="•"/>
+            </a:pPr>
+            <a:r>
+              <a:rPr lang="en-US" sz="1800" dirty="0"/>
+              <a:t>Math and Stats majors, at least consider CS 220 (Discrete Structures) – substitutes in your program requirements</a:t>
+            </a:r>
+          </a:p>
+        </p:txBody>
+      </p:sp>
+    </p:spTree>
+    <p:extLst>
+      <p:ext uri="{BB962C8B-B14F-4D97-AF65-F5344CB8AC3E}">
+        <p14:creationId xmlns:p14="http://schemas.microsoft.com/office/powerpoint/2010/main" val="926474781"/>
+      </p:ext>
+    </p:extLst>
+  </p:cSld>
+  <p:clrMapOvr>
+    <a:masterClrMapping/>
+  </p:clrMapOvr>
+  <p:transition>
+    <p:fade/>
+  </p:transition>
+</p:sld>
+</file>
+
+<file path=ppt/slides/slide3.xml><?xml version="1.0" encoding="utf-8"?>
+<p:sld xmlns:a="http://schemas.openxmlformats.org/drawingml/2006/main" xmlns:r="http://schemas.openxmlformats.org/officeDocument/2006/relationships" xmlns:p="http://schemas.openxmlformats.org/presentationml/2006/main">
+  <p:cSld>
+    <p:spTree>
+      <p:nvGrpSpPr>
+        <p:cNvPr id="1" name=""/>
+        <p:cNvGrpSpPr/>
+        <p:nvPr/>
+      </p:nvGrpSpPr>
+      <p:grpSpPr>
+        <a:xfrm>
+          <a:off x="0" y="0"/>
+          <a:ext cx="0" cy="0"/>
+          <a:chOff x="0" y="0"/>
+          <a:chExt cx="0" cy="0"/>
+        </a:xfrm>
+      </p:grpSpPr>
+      <p:sp>
+        <p:nvSpPr>
+          <p:cNvPr id="2" name="Title 1">
+            <a:extLst>
+              <a:ext uri="{FF2B5EF4-FFF2-40B4-BE49-F238E27FC236}">
+                <a16:creationId xmlns:a16="http://schemas.microsoft.com/office/drawing/2014/main" id="{9A85E54C-26C8-4A3C-AC7E-7C9E22981675}"/>
+              </a:ext>
+            </a:extLst>
+          </p:cNvPr>
+          <p:cNvSpPr>
+            <a:spLocks noGrp="1"/>
+          </p:cNvSpPr>
+          <p:nvPr>
+            <p:ph type="title"/>
+          </p:nvPr>
+        </p:nvSpPr>
+        <p:spPr/>
+        <p:txBody>
+          <a:bodyPr/>
+          <a:lstStyle/>
+          <a:p>
+            <a:r>
+              <a:rPr lang="en-US" dirty="0"/>
+              <a:t>Warm Up</a:t>
+            </a:r>
+          </a:p>
+        </p:txBody>
+      </p:sp>
+      <p:sp>
+        <p:nvSpPr>
+          <p:cNvPr id="3" name="Text Placeholder 2">
+            <a:extLst>
+              <a:ext uri="{FF2B5EF4-FFF2-40B4-BE49-F238E27FC236}">
+                <a16:creationId xmlns:a16="http://schemas.microsoft.com/office/drawing/2014/main" id="{68987E68-D992-4ECE-8552-55AA039D6C84}"/>
+              </a:ext>
+            </a:extLst>
+          </p:cNvPr>
+          <p:cNvSpPr>
+            <a:spLocks noGrp="1"/>
+          </p:cNvSpPr>
+          <p:nvPr>
+            <p:ph type="body" idx="1"/>
+          </p:nvPr>
+        </p:nvSpPr>
+        <p:spPr>
+          <a:xfrm>
+            <a:off x="628075" y="2487883"/>
+            <a:ext cx="5555011" cy="4522517"/>
+          </a:xfrm>
+        </p:spPr>
+        <p:txBody>
+          <a:bodyPr/>
+          <a:lstStyle/>
+          <a:p>
+            <a:r>
+              <a:rPr lang="en-US" dirty="0"/>
+              <a:t>Select a dedicated programmer</a:t>
+            </a:r>
+          </a:p>
+          <a:p>
+            <a:r>
+              <a:rPr lang="en-US" dirty="0"/>
+              <a:t>Write the following classes &amp; interfaces</a:t>
+            </a:r>
+          </a:p>
+          <a:p>
+            <a:pPr lvl="1"/>
+            <a:r>
+              <a:rPr lang="en-US" dirty="0"/>
+              <a:t>We will use them throughout the lecture</a:t>
+            </a:r>
+          </a:p>
+          <a:p>
+            <a:r>
+              <a:rPr lang="en-US" dirty="0"/>
+              <a:t>Write a main class that constructs</a:t>
+            </a:r>
+          </a:p>
+          <a:p>
+            <a:pPr lvl="1"/>
+            <a:r>
+              <a:rPr lang="en-US" dirty="0"/>
+              <a:t>3 rectangles</a:t>
+            </a:r>
+          </a:p>
+          <a:p>
+            <a:pPr lvl="1"/>
+            <a:r>
+              <a:rPr lang="en-US" dirty="0"/>
+              <a:t>2 circles </a:t>
+            </a:r>
+          </a:p>
+          <a:p>
+            <a:pPr lvl="1"/>
+            <a:r>
+              <a:rPr lang="en-US" dirty="0"/>
+              <a:t>1 triangle</a:t>
+            </a:r>
+          </a:p>
+          <a:p>
+            <a:pPr lvl="1"/>
+            <a:r>
+              <a:rPr lang="en-US" dirty="0"/>
+              <a:t>Stores them into an </a:t>
+            </a:r>
+            <a:r>
+              <a:rPr lang="en-US" dirty="0" err="1"/>
+              <a:t>ArrayList</a:t>
+            </a:r>
+            <a:endParaRPr lang="en-US" dirty="0"/>
+          </a:p>
+          <a:p>
+            <a:r>
+              <a:rPr lang="en-US" dirty="0"/>
+              <a:t>For color Strings use:</a:t>
+            </a:r>
+          </a:p>
+          <a:p>
+            <a:pPr lvl="1"/>
+            <a:r>
+              <a:rPr lang="en-US" dirty="0"/>
+              <a:t>0-255,0-255,0-255</a:t>
+            </a:r>
+          </a:p>
+          <a:p>
+            <a:pPr lvl="1"/>
+            <a:r>
+              <a:rPr lang="en-US" dirty="0"/>
+              <a:t>Example: 30,77,43</a:t>
+            </a:r>
+          </a:p>
+          <a:p>
+            <a:pPr lvl="1"/>
+            <a:r>
+              <a:rPr lang="en-US" dirty="0"/>
+              <a:t>(</a:t>
+            </a:r>
+            <a:r>
+              <a:rPr lang="en-US" dirty="0" err="1"/>
+              <a:t>red,green,blue</a:t>
+            </a:r>
+            <a:r>
+              <a:rPr lang="en-US" dirty="0"/>
+              <a:t>)</a:t>
+            </a:r>
+          </a:p>
+        </p:txBody>
+      </p:sp>
+      <p:graphicFrame>
+        <p:nvGraphicFramePr>
+          <p:cNvPr id="4" name="Table 4">
+            <a:extLst>
+              <a:ext uri="{FF2B5EF4-FFF2-40B4-BE49-F238E27FC236}">
+                <a16:creationId xmlns:a16="http://schemas.microsoft.com/office/drawing/2014/main" id="{77E6D03A-EFA5-453E-BCAE-4554CB2E1A81}"/>
+              </a:ext>
+            </a:extLst>
+          </p:cNvPr>
+          <p:cNvGraphicFramePr>
+            <a:graphicFrameLocks noGrp="1"/>
+          </p:cNvGraphicFramePr>
+          <p:nvPr>
+            <p:extLst>
+              <p:ext uri="{D42A27DB-BD31-4B8C-83A1-F6EECF244321}">
+                <p14:modId xmlns:p14="http://schemas.microsoft.com/office/powerpoint/2010/main" val="3193769944"/>
+              </p:ext>
+            </p:extLst>
+          </p:nvPr>
+        </p:nvGraphicFramePr>
+        <p:xfrm>
+          <a:off x="8632002" y="234279"/>
+          <a:ext cx="2844801" cy="1668666"/>
+        </p:xfrm>
+        <a:graphic>
+          <a:graphicData uri="http://schemas.openxmlformats.org/drawingml/2006/table">
+            <a:tbl>
+              <a:tblPr firstRow="1" bandRow="1">
+                <a:tableStyleId>{D7AC3CCA-C797-4891-BE02-D94E43425B78}</a:tableStyleId>
+              </a:tblPr>
+              <a:tblGrid>
+                <a:gridCol w="2844801">
+                  <a:extLst>
+                    <a:ext uri="{9D8B030D-6E8A-4147-A177-3AD203B41FA5}">
+                      <a16:colId xmlns:a16="http://schemas.microsoft.com/office/drawing/2014/main" val="1398974874"/>
+                    </a:ext>
+                  </a:extLst>
+                </a:gridCol>
+              </a:tblGrid>
+              <a:tr h="370840">
+                <a:tc>
+                  <a:txBody>
+                    <a:bodyPr/>
+                    <a:lstStyle/>
+                    <a:p>
+                      <a:pPr algn="ctr"/>
+                      <a:r>
+                        <a:rPr lang="en-US" sz="1600" dirty="0" err="1"/>
+                        <a:t>AbstractShape</a:t>
+                      </a:r>
+                      <a:endParaRPr lang="en-US" sz="1600" dirty="0"/>
+                    </a:p>
+                  </a:txBody>
+                  <a:tcPr/>
+                </a:tc>
+                <a:extLst>
+                  <a:ext uri="{0D108BD9-81ED-4DB2-BD59-A6C34878D82A}">
+                    <a16:rowId xmlns:a16="http://schemas.microsoft.com/office/drawing/2014/main" val="3942924472"/>
+                  </a:ext>
+                </a:extLst>
+              </a:tr>
+              <a:tr h="370840">
+                <a:tc>
+                  <a:txBody>
+                    <a:bodyPr/>
+                    <a:lstStyle/>
+                    <a:p>
+                      <a:r>
+                        <a:rPr lang="en-US" sz="1600" dirty="0"/>
+                        <a:t>+ </a:t>
+                      </a:r>
+                      <a:r>
+                        <a:rPr lang="en-US" sz="1600" dirty="0" err="1"/>
+                        <a:t>AbstractShape</a:t>
+                      </a:r>
+                      <a:r>
+                        <a:rPr lang="en-US" sz="1600" dirty="0"/>
+                        <a:t>(int)</a:t>
+                      </a:r>
+                    </a:p>
+                  </a:txBody>
+                  <a:tcPr/>
+                </a:tc>
+                <a:extLst>
+                  <a:ext uri="{0D108BD9-81ED-4DB2-BD59-A6C34878D82A}">
+                    <a16:rowId xmlns:a16="http://schemas.microsoft.com/office/drawing/2014/main" val="1511474424"/>
+                  </a:ext>
+                </a:extLst>
+              </a:tr>
+              <a:tr h="463493">
+                <a:tc>
+                  <a:txBody>
+                    <a:bodyPr/>
+                    <a:lstStyle/>
+                    <a:p>
+                      <a:r>
+                        <a:rPr lang="en-US" sz="1600" dirty="0"/>
+                        <a:t>+ </a:t>
+                      </a:r>
+                      <a:r>
+                        <a:rPr lang="en-US" sz="1600" dirty="0" err="1"/>
+                        <a:t>getSides</a:t>
+                      </a:r>
+                      <a:r>
+                        <a:rPr lang="en-US" sz="1600" dirty="0"/>
+                        <a:t>() : int</a:t>
+                      </a:r>
+                    </a:p>
+                  </a:txBody>
+                  <a:tcPr/>
+                </a:tc>
+                <a:extLst>
+                  <a:ext uri="{0D108BD9-81ED-4DB2-BD59-A6C34878D82A}">
+                    <a16:rowId xmlns:a16="http://schemas.microsoft.com/office/drawing/2014/main" val="1740472309"/>
+                  </a:ext>
+                </a:extLst>
+              </a:tr>
+              <a:tr h="463493">
+                <a:tc>
+                  <a:txBody>
+                    <a:bodyPr/>
+                    <a:lstStyle/>
+                    <a:p>
+                      <a:r>
+                        <a:rPr lang="en-US" sz="1600" i="1" dirty="0"/>
+                        <a:t>+ </a:t>
+                      </a:r>
+                      <a:r>
+                        <a:rPr lang="en-US" sz="1600" i="1" dirty="0" err="1"/>
+                        <a:t>getArea</a:t>
+                      </a:r>
+                      <a:r>
+                        <a:rPr lang="en-US" sz="1600" i="1" dirty="0"/>
+                        <a:t>() : double abstract</a:t>
+                      </a:r>
+                    </a:p>
+                  </a:txBody>
+                  <a:tcPr/>
+                </a:tc>
+                <a:extLst>
+                  <a:ext uri="{0D108BD9-81ED-4DB2-BD59-A6C34878D82A}">
+                    <a16:rowId xmlns:a16="http://schemas.microsoft.com/office/drawing/2014/main" val="3343832581"/>
+                  </a:ext>
+                </a:extLst>
+              </a:tr>
+            </a:tbl>
+          </a:graphicData>
+        </a:graphic>
+      </p:graphicFrame>
+      <p:graphicFrame>
+        <p:nvGraphicFramePr>
+          <p:cNvPr id="6" name="Table 4">
+            <a:extLst>
+              <a:ext uri="{FF2B5EF4-FFF2-40B4-BE49-F238E27FC236}">
+                <a16:creationId xmlns:a16="http://schemas.microsoft.com/office/drawing/2014/main" id="{2665A028-1891-46FB-96E2-A16BF89BD8B3}"/>
+              </a:ext>
+            </a:extLst>
+          </p:cNvPr>
+          <p:cNvGraphicFramePr>
+            <a:graphicFrameLocks noGrp="1"/>
+          </p:cNvGraphicFramePr>
+          <p:nvPr>
+            <p:extLst>
+              <p:ext uri="{D42A27DB-BD31-4B8C-83A1-F6EECF244321}">
+                <p14:modId xmlns:p14="http://schemas.microsoft.com/office/powerpoint/2010/main" val="2785954654"/>
+              </p:ext>
+            </p:extLst>
+          </p:nvPr>
+        </p:nvGraphicFramePr>
+        <p:xfrm>
+          <a:off x="10740569" y="3004805"/>
+          <a:ext cx="2888343" cy="741680"/>
+        </p:xfrm>
+        <a:graphic>
+          <a:graphicData uri="http://schemas.openxmlformats.org/drawingml/2006/table">
+            <a:tbl>
+              <a:tblPr firstRow="1" bandRow="1">
+                <a:tableStyleId>{D7AC3CCA-C797-4891-BE02-D94E43425B78}</a:tableStyleId>
+              </a:tblPr>
+              <a:tblGrid>
+                <a:gridCol w="2888343">
+                  <a:extLst>
+                    <a:ext uri="{9D8B030D-6E8A-4147-A177-3AD203B41FA5}">
+                      <a16:colId xmlns:a16="http://schemas.microsoft.com/office/drawing/2014/main" val="1398974874"/>
+                    </a:ext>
+                  </a:extLst>
+                </a:gridCol>
+              </a:tblGrid>
+              <a:tr h="370840">
+                <a:tc>
+                  <a:txBody>
+                    <a:bodyPr/>
+                    <a:lstStyle/>
+                    <a:p>
+                      <a:pPr algn="ctr"/>
+                      <a:r>
+                        <a:rPr lang="en-US" sz="1600" dirty="0"/>
+                        <a:t>Circle</a:t>
+                      </a:r>
+                    </a:p>
+                  </a:txBody>
+                  <a:tcPr/>
+                </a:tc>
+                <a:extLst>
+                  <a:ext uri="{0D108BD9-81ED-4DB2-BD59-A6C34878D82A}">
+                    <a16:rowId xmlns:a16="http://schemas.microsoft.com/office/drawing/2014/main" val="3942924472"/>
+                  </a:ext>
+                </a:extLst>
+              </a:tr>
+              <a:tr h="370840">
+                <a:tc>
+                  <a:txBody>
+                    <a:bodyPr/>
+                    <a:lstStyle/>
+                    <a:p>
+                      <a:r>
+                        <a:rPr lang="en-US" sz="1600" dirty="0"/>
+                        <a:t>Circle(int, String)</a:t>
+                      </a:r>
+                    </a:p>
+                  </a:txBody>
+                  <a:tcPr/>
+                </a:tc>
+                <a:extLst>
+                  <a:ext uri="{0D108BD9-81ED-4DB2-BD59-A6C34878D82A}">
+                    <a16:rowId xmlns:a16="http://schemas.microsoft.com/office/drawing/2014/main" val="3354831625"/>
+                  </a:ext>
+                </a:extLst>
+              </a:tr>
+            </a:tbl>
+          </a:graphicData>
+        </a:graphic>
+      </p:graphicFrame>
+      <p:graphicFrame>
+        <p:nvGraphicFramePr>
+          <p:cNvPr id="7" name="Table 4">
+            <a:extLst>
+              <a:ext uri="{FF2B5EF4-FFF2-40B4-BE49-F238E27FC236}">
+                <a16:creationId xmlns:a16="http://schemas.microsoft.com/office/drawing/2014/main" id="{06B73342-A6EB-4B46-AC3E-6F23D11F7EBC}"/>
+              </a:ext>
+            </a:extLst>
+          </p:cNvPr>
+          <p:cNvGraphicFramePr>
+            <a:graphicFrameLocks noGrp="1"/>
+          </p:cNvGraphicFramePr>
+          <p:nvPr>
+            <p:extLst>
+              <p:ext uri="{D42A27DB-BD31-4B8C-83A1-F6EECF244321}">
+                <p14:modId xmlns:p14="http://schemas.microsoft.com/office/powerpoint/2010/main" val="1176901123"/>
+              </p:ext>
+            </p:extLst>
+          </p:nvPr>
+        </p:nvGraphicFramePr>
+        <p:xfrm>
+          <a:off x="8632002" y="4260757"/>
+          <a:ext cx="2844801" cy="706120"/>
+        </p:xfrm>
+        <a:graphic>
+          <a:graphicData uri="http://schemas.openxmlformats.org/drawingml/2006/table">
+            <a:tbl>
+              <a:tblPr firstRow="1" bandRow="1">
+                <a:tableStyleId>{D7AC3CCA-C797-4891-BE02-D94E43425B78}</a:tableStyleId>
+              </a:tblPr>
+              <a:tblGrid>
+                <a:gridCol w="2844801">
+                  <a:extLst>
+                    <a:ext uri="{9D8B030D-6E8A-4147-A177-3AD203B41FA5}">
+                      <a16:colId xmlns:a16="http://schemas.microsoft.com/office/drawing/2014/main" val="1398974874"/>
+                    </a:ext>
+                  </a:extLst>
+                </a:gridCol>
+              </a:tblGrid>
+              <a:tr h="318474">
+                <a:tc>
+                  <a:txBody>
+                    <a:bodyPr/>
+                    <a:lstStyle/>
+                    <a:p>
+                      <a:pPr algn="ctr"/>
+                      <a:r>
+                        <a:rPr lang="en-US" sz="1600" dirty="0"/>
+                        <a:t>Triangle</a:t>
+                      </a:r>
+                    </a:p>
+                  </a:txBody>
+                  <a:tcPr/>
+                </a:tc>
+                <a:extLst>
+                  <a:ext uri="{0D108BD9-81ED-4DB2-BD59-A6C34878D82A}">
+                    <a16:rowId xmlns:a16="http://schemas.microsoft.com/office/drawing/2014/main" val="3942924472"/>
+                  </a:ext>
+                </a:extLst>
+              </a:tr>
+              <a:tr h="370840">
+                <a:tc>
+                  <a:txBody>
+                    <a:bodyPr/>
+                    <a:lstStyle/>
+                    <a:p>
+                      <a:r>
+                        <a:rPr lang="en-US" sz="1600" dirty="0"/>
+                        <a:t>Triangle(int, int, String)</a:t>
+                      </a:r>
+                    </a:p>
+                  </a:txBody>
+                  <a:tcPr/>
+                </a:tc>
+                <a:extLst>
+                  <a:ext uri="{0D108BD9-81ED-4DB2-BD59-A6C34878D82A}">
+                    <a16:rowId xmlns:a16="http://schemas.microsoft.com/office/drawing/2014/main" val="702323302"/>
+                  </a:ext>
+                </a:extLst>
+              </a:tr>
+            </a:tbl>
+          </a:graphicData>
+        </a:graphic>
+      </p:graphicFrame>
+      <p:graphicFrame>
+        <p:nvGraphicFramePr>
+          <p:cNvPr id="8" name="Table 7">
+            <a:extLst>
+              <a:ext uri="{FF2B5EF4-FFF2-40B4-BE49-F238E27FC236}">
+                <a16:creationId xmlns:a16="http://schemas.microsoft.com/office/drawing/2014/main" id="{705F1A91-1674-40F1-A89E-3755FEB86107}"/>
+              </a:ext>
+            </a:extLst>
+          </p:cNvPr>
+          <p:cNvGraphicFramePr>
+            <a:graphicFrameLocks noGrp="1"/>
+          </p:cNvGraphicFramePr>
+          <p:nvPr>
+            <p:extLst>
+              <p:ext uri="{D42A27DB-BD31-4B8C-83A1-F6EECF244321}">
+                <p14:modId xmlns:p14="http://schemas.microsoft.com/office/powerpoint/2010/main" val="132485492"/>
+              </p:ext>
+            </p:extLst>
+          </p:nvPr>
+        </p:nvGraphicFramePr>
+        <p:xfrm>
+          <a:off x="6473367" y="3072961"/>
+          <a:ext cx="2844801" cy="741680"/>
+        </p:xfrm>
+        <a:graphic>
+          <a:graphicData uri="http://schemas.openxmlformats.org/drawingml/2006/table">
+            <a:tbl>
+              <a:tblPr firstRow="1" bandRow="1">
+                <a:tableStyleId>{D7AC3CCA-C797-4891-BE02-D94E43425B78}</a:tableStyleId>
+              </a:tblPr>
+              <a:tblGrid>
+                <a:gridCol w="2844801">
+                  <a:extLst>
+                    <a:ext uri="{9D8B030D-6E8A-4147-A177-3AD203B41FA5}">
+                      <a16:colId xmlns:a16="http://schemas.microsoft.com/office/drawing/2014/main" val="1398974874"/>
+                    </a:ext>
+                  </a:extLst>
+                </a:gridCol>
+              </a:tblGrid>
+              <a:tr h="370840">
+                <a:tc>
+                  <a:txBody>
+                    <a:bodyPr/>
+                    <a:lstStyle/>
+                    <a:p>
+                      <a:pPr algn="ctr"/>
+                      <a:r>
+                        <a:rPr lang="en-US" sz="1600" dirty="0"/>
+                        <a:t>Rectangle</a:t>
+                      </a:r>
+                    </a:p>
+                  </a:txBody>
+                  <a:tcPr/>
+                </a:tc>
+                <a:extLst>
+                  <a:ext uri="{0D108BD9-81ED-4DB2-BD59-A6C34878D82A}">
+                    <a16:rowId xmlns:a16="http://schemas.microsoft.com/office/drawing/2014/main" val="3942924472"/>
+                  </a:ext>
+                </a:extLst>
+              </a:tr>
+              <a:tr h="370840">
+                <a:tc>
+                  <a:txBody>
+                    <a:bodyPr/>
+                    <a:lstStyle/>
+                    <a:p>
+                      <a:r>
+                        <a:rPr lang="en-US" sz="1600" dirty="0"/>
+                        <a:t>Rectangle(int, int) </a:t>
+                      </a:r>
+                    </a:p>
+                  </a:txBody>
+                  <a:tcPr/>
+                </a:tc>
+                <a:extLst>
+                  <a:ext uri="{0D108BD9-81ED-4DB2-BD59-A6C34878D82A}">
+                    <a16:rowId xmlns:a16="http://schemas.microsoft.com/office/drawing/2014/main" val="2146698054"/>
+                  </a:ext>
+                </a:extLst>
+              </a:tr>
+            </a:tbl>
+          </a:graphicData>
+        </a:graphic>
+      </p:graphicFrame>
+      <p:cxnSp>
+        <p:nvCxnSpPr>
+          <p:cNvPr id="13" name="Connector: Elbow 12">
+            <a:extLst>
+              <a:ext uri="{FF2B5EF4-FFF2-40B4-BE49-F238E27FC236}">
+                <a16:creationId xmlns:a16="http://schemas.microsoft.com/office/drawing/2014/main" id="{50500F4D-3D71-455C-84AF-3EDBF4D4762D}"/>
+              </a:ext>
+            </a:extLst>
+          </p:cNvPr>
+          <p:cNvCxnSpPr>
+            <a:cxnSpLocks/>
+            <a:stCxn id="8" idx="0"/>
+            <a:endCxn id="4" idx="2"/>
+          </p:cNvCxnSpPr>
+          <p:nvPr/>
+        </p:nvCxnSpPr>
+        <p:spPr>
+          <a:xfrm rot="5400000" flipH="1" flipV="1">
+            <a:off x="8390076" y="1408636"/>
+            <a:ext cx="1170016" cy="2158635"/>
+          </a:xfrm>
+          <a:prstGeom prst="bentConnector3">
+            <a:avLst>
+              <a:gd name="adj1" fmla="val 50000"/>
+            </a:avLst>
+          </a:prstGeom>
+          <a:ln>
+            <a:solidFill>
+              <a:schemeClr val="tx1"/>
+            </a:solidFill>
+            <a:tailEnd type="triangle"/>
+          </a:ln>
+        </p:spPr>
+        <p:style>
+          <a:lnRef idx="2">
+            <a:schemeClr val="accent1"/>
+          </a:lnRef>
+          <a:fillRef idx="0">
+            <a:schemeClr val="accent1"/>
+          </a:fillRef>
+          <a:effectRef idx="1">
+            <a:schemeClr val="accent1"/>
+          </a:effectRef>
+          <a:fontRef idx="minor">
+            <a:schemeClr val="tx1"/>
+          </a:fontRef>
+        </p:style>
+      </p:cxnSp>
+      <p:cxnSp>
+        <p:nvCxnSpPr>
+          <p:cNvPr id="17" name="Connector: Elbow 16">
+            <a:extLst>
+              <a:ext uri="{FF2B5EF4-FFF2-40B4-BE49-F238E27FC236}">
+                <a16:creationId xmlns:a16="http://schemas.microsoft.com/office/drawing/2014/main" id="{0831D382-4038-451C-8190-670359A36282}"/>
+              </a:ext>
+            </a:extLst>
+          </p:cNvPr>
+          <p:cNvCxnSpPr>
+            <a:cxnSpLocks/>
+            <a:stCxn id="6" idx="0"/>
+            <a:endCxn id="4" idx="2"/>
+          </p:cNvCxnSpPr>
+          <p:nvPr/>
+        </p:nvCxnSpPr>
+        <p:spPr>
+          <a:xfrm rot="16200000" flipV="1">
+            <a:off x="10568641" y="1388706"/>
+            <a:ext cx="1101860" cy="2130338"/>
+          </a:xfrm>
+          <a:prstGeom prst="bentConnector3">
+            <a:avLst>
+              <a:gd name="adj1" fmla="val 50000"/>
+            </a:avLst>
+          </a:prstGeom>
+          <a:ln>
+            <a:solidFill>
+              <a:schemeClr val="tx1"/>
+            </a:solidFill>
+            <a:tailEnd type="triangle"/>
+          </a:ln>
+        </p:spPr>
+        <p:style>
+          <a:lnRef idx="2">
+            <a:schemeClr val="accent1"/>
+          </a:lnRef>
+          <a:fillRef idx="0">
+            <a:schemeClr val="accent1"/>
+          </a:fillRef>
+          <a:effectRef idx="1">
+            <a:schemeClr val="accent1"/>
+          </a:effectRef>
+          <a:fontRef idx="minor">
+            <a:schemeClr val="tx1"/>
+          </a:fontRef>
+        </p:style>
+      </p:cxnSp>
+      <p:cxnSp>
+        <p:nvCxnSpPr>
+          <p:cNvPr id="22" name="Straight Arrow Connector 21">
+            <a:extLst>
+              <a:ext uri="{FF2B5EF4-FFF2-40B4-BE49-F238E27FC236}">
+                <a16:creationId xmlns:a16="http://schemas.microsoft.com/office/drawing/2014/main" id="{50DF65F1-9F99-40DD-99BD-8029E5EA9992}"/>
+              </a:ext>
+            </a:extLst>
+          </p:cNvPr>
+          <p:cNvCxnSpPr>
+            <a:cxnSpLocks/>
+          </p:cNvCxnSpPr>
+          <p:nvPr/>
+        </p:nvCxnSpPr>
+        <p:spPr>
+          <a:xfrm flipV="1">
+            <a:off x="10054402" y="2384021"/>
+            <a:ext cx="0" cy="1876736"/>
+          </a:xfrm>
+          <a:prstGeom prst="straightConnector1">
+            <a:avLst/>
+          </a:prstGeom>
+          <a:ln>
+            <a:solidFill>
+              <a:schemeClr val="tx1"/>
+            </a:solidFill>
+            <a:tailEnd type="triangle"/>
+          </a:ln>
+        </p:spPr>
+        <p:style>
+          <a:lnRef idx="2">
+            <a:schemeClr val="accent1"/>
+          </a:lnRef>
+          <a:fillRef idx="0">
+            <a:schemeClr val="accent1"/>
+          </a:fillRef>
+          <a:effectRef idx="1">
+            <a:schemeClr val="accent1"/>
+          </a:effectRef>
+          <a:fontRef idx="minor">
+            <a:schemeClr val="tx1"/>
+          </a:fontRef>
+        </p:style>
+      </p:cxnSp>
+      <p:sp>
+        <p:nvSpPr>
+          <p:cNvPr id="24" name="TextBox 23">
+            <a:extLst>
+              <a:ext uri="{FF2B5EF4-FFF2-40B4-BE49-F238E27FC236}">
+                <a16:creationId xmlns:a16="http://schemas.microsoft.com/office/drawing/2014/main" id="{BD093460-827C-4D2F-9199-685D651F2CC8}"/>
+              </a:ext>
+            </a:extLst>
+          </p:cNvPr>
+          <p:cNvSpPr txBox="1"/>
+          <p:nvPr/>
+        </p:nvSpPr>
+        <p:spPr>
+          <a:xfrm>
+            <a:off x="9395996" y="2581854"/>
+            <a:ext cx="1219199" cy="400110"/>
+          </a:xfrm>
+          <a:prstGeom prst="rect">
+            <a:avLst/>
+          </a:prstGeom>
+          <a:solidFill>
+            <a:schemeClr val="bg1"/>
+          </a:solidFill>
+        </p:spPr>
+        <p:txBody>
+          <a:bodyPr wrap="square" rtlCol="0">
+            <a:spAutoFit/>
+          </a:bodyPr>
+          <a:lstStyle/>
+          <a:p>
+            <a:r>
+              <a:rPr lang="en-US" dirty="0"/>
+              <a:t>extends</a:t>
+            </a:r>
+          </a:p>
+        </p:txBody>
+      </p:sp>
+      <p:graphicFrame>
+        <p:nvGraphicFramePr>
+          <p:cNvPr id="27" name="Table 26">
+            <a:extLst>
+              <a:ext uri="{FF2B5EF4-FFF2-40B4-BE49-F238E27FC236}">
+                <a16:creationId xmlns:a16="http://schemas.microsoft.com/office/drawing/2014/main" id="{74317C75-8376-4BB4-BBE2-FFB0847B105C}"/>
+              </a:ext>
+            </a:extLst>
+          </p:cNvPr>
+          <p:cNvGraphicFramePr>
+            <a:graphicFrameLocks noGrp="1"/>
+          </p:cNvGraphicFramePr>
+          <p:nvPr>
+            <p:extLst>
+              <p:ext uri="{D42A27DB-BD31-4B8C-83A1-F6EECF244321}">
+                <p14:modId xmlns:p14="http://schemas.microsoft.com/office/powerpoint/2010/main" val="1024204047"/>
+              </p:ext>
+            </p:extLst>
+          </p:nvPr>
+        </p:nvGraphicFramePr>
+        <p:xfrm>
+          <a:off x="5419083" y="5127775"/>
+          <a:ext cx="2844801" cy="2062480"/>
+        </p:xfrm>
+        <a:graphic>
+          <a:graphicData uri="http://schemas.openxmlformats.org/drawingml/2006/table">
+            <a:tbl>
+              <a:tblPr firstRow="1" bandRow="1">
+                <a:tableStyleId>{D7AC3CCA-C797-4891-BE02-D94E43425B78}</a:tableStyleId>
+              </a:tblPr>
+              <a:tblGrid>
+                <a:gridCol w="2844801">
+                  <a:extLst>
+                    <a:ext uri="{9D8B030D-6E8A-4147-A177-3AD203B41FA5}">
+                      <a16:colId xmlns:a16="http://schemas.microsoft.com/office/drawing/2014/main" val="1398974874"/>
+                    </a:ext>
+                  </a:extLst>
+                </a:gridCol>
+              </a:tblGrid>
+              <a:tr h="370840">
+                <a:tc>
+                  <a:txBody>
+                    <a:bodyPr/>
+                    <a:lstStyle/>
+                    <a:p>
+                      <a:pPr algn="ctr"/>
+                      <a:r>
+                        <a:rPr lang="en-US" sz="1600" dirty="0" err="1"/>
+                        <a:t>HasWidthHeight</a:t>
+                      </a:r>
+                      <a:br>
+                        <a:rPr lang="en-US" sz="1600" dirty="0"/>
+                      </a:br>
+                      <a:r>
+                        <a:rPr lang="en-US" sz="1600" dirty="0"/>
+                        <a:t>&lt;&lt;interface&gt;&gt;</a:t>
+                      </a:r>
+                    </a:p>
+                  </a:txBody>
+                  <a:tcPr/>
+                </a:tc>
+                <a:extLst>
+                  <a:ext uri="{0D108BD9-81ED-4DB2-BD59-A6C34878D82A}">
+                    <a16:rowId xmlns:a16="http://schemas.microsoft.com/office/drawing/2014/main" val="3942924472"/>
+                  </a:ext>
+                </a:extLst>
+              </a:tr>
+              <a:tr h="370840">
+                <a:tc>
+                  <a:txBody>
+                    <a:bodyPr/>
+                    <a:lstStyle/>
+                    <a:p>
+                      <a:r>
+                        <a:rPr lang="en-US" sz="1600" dirty="0" err="1"/>
+                        <a:t>getHeight</a:t>
+                      </a:r>
+                      <a:r>
+                        <a:rPr lang="en-US" sz="1600" dirty="0"/>
+                        <a:t>() : int</a:t>
+                      </a:r>
+                    </a:p>
+                  </a:txBody>
+                  <a:tcPr/>
+                </a:tc>
+                <a:extLst>
+                  <a:ext uri="{0D108BD9-81ED-4DB2-BD59-A6C34878D82A}">
+                    <a16:rowId xmlns:a16="http://schemas.microsoft.com/office/drawing/2014/main" val="2146698054"/>
+                  </a:ext>
+                </a:extLst>
+              </a:tr>
+              <a:tr h="370840">
+                <a:tc>
+                  <a:txBody>
+                    <a:bodyPr/>
+                    <a:lstStyle/>
+                    <a:p>
+                      <a:r>
+                        <a:rPr lang="en-US" sz="1600" dirty="0" err="1"/>
+                        <a:t>getWeight</a:t>
+                      </a:r>
+                      <a:r>
+                        <a:rPr lang="en-US" sz="1600" dirty="0"/>
+                        <a:t>(): int</a:t>
+                      </a:r>
+                    </a:p>
+                  </a:txBody>
+                  <a:tcPr/>
+                </a:tc>
+                <a:extLst>
+                  <a:ext uri="{0D108BD9-81ED-4DB2-BD59-A6C34878D82A}">
+                    <a16:rowId xmlns:a16="http://schemas.microsoft.com/office/drawing/2014/main" val="4184681860"/>
+                  </a:ext>
+                </a:extLst>
+              </a:tr>
+              <a:tr h="370840">
+                <a:tc>
+                  <a:txBody>
+                    <a:bodyPr/>
+                    <a:lstStyle/>
+                    <a:p>
+                      <a:r>
+                        <a:rPr lang="en-US" sz="1600" dirty="0" err="1"/>
+                        <a:t>setHeight</a:t>
+                      </a:r>
+                      <a:r>
+                        <a:rPr lang="en-US" sz="1600" dirty="0"/>
+                        <a:t>(int): int</a:t>
+                      </a:r>
+                    </a:p>
+                  </a:txBody>
+                  <a:tcPr/>
+                </a:tc>
+                <a:extLst>
+                  <a:ext uri="{0D108BD9-81ED-4DB2-BD59-A6C34878D82A}">
+                    <a16:rowId xmlns:a16="http://schemas.microsoft.com/office/drawing/2014/main" val="3641973094"/>
+                  </a:ext>
+                </a:extLst>
+              </a:tr>
+              <a:tr h="370840">
+                <a:tc>
+                  <a:txBody>
+                    <a:bodyPr/>
+                    <a:lstStyle/>
+                    <a:p>
+                      <a:r>
+                        <a:rPr lang="en-US" sz="1600" dirty="0" err="1"/>
+                        <a:t>setWidth</a:t>
+                      </a:r>
+                      <a:r>
+                        <a:rPr lang="en-US" sz="1600" dirty="0"/>
+                        <a:t>(int): int</a:t>
+                      </a:r>
+                    </a:p>
+                  </a:txBody>
+                  <a:tcPr/>
+                </a:tc>
+                <a:extLst>
+                  <a:ext uri="{0D108BD9-81ED-4DB2-BD59-A6C34878D82A}">
+                    <a16:rowId xmlns:a16="http://schemas.microsoft.com/office/drawing/2014/main" val="4098003502"/>
+                  </a:ext>
+                </a:extLst>
+              </a:tr>
+            </a:tbl>
+          </a:graphicData>
+        </a:graphic>
+      </p:graphicFrame>
+      <p:graphicFrame>
+        <p:nvGraphicFramePr>
+          <p:cNvPr id="28" name="Table 27">
+            <a:extLst>
+              <a:ext uri="{FF2B5EF4-FFF2-40B4-BE49-F238E27FC236}">
+                <a16:creationId xmlns:a16="http://schemas.microsoft.com/office/drawing/2014/main" id="{06B79030-4327-4512-9CD2-D17217A81A01}"/>
+              </a:ext>
+            </a:extLst>
+          </p:cNvPr>
+          <p:cNvGraphicFramePr>
+            <a:graphicFrameLocks noGrp="1"/>
+          </p:cNvGraphicFramePr>
+          <p:nvPr>
+            <p:extLst>
+              <p:ext uri="{D42A27DB-BD31-4B8C-83A1-F6EECF244321}">
+                <p14:modId xmlns:p14="http://schemas.microsoft.com/office/powerpoint/2010/main" val="1950139537"/>
+              </p:ext>
+            </p:extLst>
+          </p:nvPr>
+        </p:nvGraphicFramePr>
+        <p:xfrm>
+          <a:off x="10769597" y="5869455"/>
+          <a:ext cx="2844801" cy="1320800"/>
+        </p:xfrm>
+        <a:graphic>
+          <a:graphicData uri="http://schemas.openxmlformats.org/drawingml/2006/table">
+            <a:tbl>
+              <a:tblPr firstRow="1" bandRow="1">
+                <a:tableStyleId>{D7AC3CCA-C797-4891-BE02-D94E43425B78}</a:tableStyleId>
+              </a:tblPr>
+              <a:tblGrid>
+                <a:gridCol w="2844801">
+                  <a:extLst>
+                    <a:ext uri="{9D8B030D-6E8A-4147-A177-3AD203B41FA5}">
+                      <a16:colId xmlns:a16="http://schemas.microsoft.com/office/drawing/2014/main" val="1398974874"/>
+                    </a:ext>
+                  </a:extLst>
+                </a:gridCol>
+              </a:tblGrid>
+              <a:tr h="229819">
+                <a:tc>
+                  <a:txBody>
+                    <a:bodyPr/>
+                    <a:lstStyle/>
+                    <a:p>
+                      <a:pPr algn="ctr"/>
+                      <a:r>
+                        <a:rPr lang="en-US" sz="1600" dirty="0" err="1"/>
+                        <a:t>HasColor</a:t>
+                      </a:r>
+                      <a:br>
+                        <a:rPr lang="en-US" sz="1600" dirty="0"/>
+                      </a:br>
+                      <a:r>
+                        <a:rPr lang="en-US" sz="1600" dirty="0"/>
+                        <a:t>&lt;&lt;interface&gt;&gt;</a:t>
+                      </a:r>
+                    </a:p>
+                  </a:txBody>
+                  <a:tcPr/>
+                </a:tc>
+                <a:extLst>
+                  <a:ext uri="{0D108BD9-81ED-4DB2-BD59-A6C34878D82A}">
+                    <a16:rowId xmlns:a16="http://schemas.microsoft.com/office/drawing/2014/main" val="3942924472"/>
+                  </a:ext>
+                </a:extLst>
+              </a:tr>
+              <a:tr h="370840">
+                <a:tc>
+                  <a:txBody>
+                    <a:bodyPr/>
+                    <a:lstStyle/>
+                    <a:p>
+                      <a:r>
+                        <a:rPr lang="en-US" sz="1600" dirty="0" err="1"/>
+                        <a:t>setColor</a:t>
+                      </a:r>
+                      <a:r>
+                        <a:rPr lang="en-US" sz="1600" dirty="0"/>
+                        <a:t>(String)</a:t>
+                      </a:r>
+                    </a:p>
+                  </a:txBody>
+                  <a:tcPr/>
+                </a:tc>
+                <a:extLst>
+                  <a:ext uri="{0D108BD9-81ED-4DB2-BD59-A6C34878D82A}">
+                    <a16:rowId xmlns:a16="http://schemas.microsoft.com/office/drawing/2014/main" val="2146698054"/>
+                  </a:ext>
+                </a:extLst>
+              </a:tr>
+              <a:tr h="370840">
+                <a:tc>
+                  <a:txBody>
+                    <a:bodyPr/>
+                    <a:lstStyle/>
+                    <a:p>
+                      <a:r>
+                        <a:rPr lang="en-US" sz="1600" dirty="0" err="1"/>
+                        <a:t>getColor</a:t>
+                      </a:r>
+                      <a:r>
+                        <a:rPr lang="en-US" sz="1600" dirty="0"/>
+                        <a:t>(String)</a:t>
+                      </a:r>
+                    </a:p>
+                  </a:txBody>
+                  <a:tcPr/>
+                </a:tc>
+                <a:extLst>
+                  <a:ext uri="{0D108BD9-81ED-4DB2-BD59-A6C34878D82A}">
+                    <a16:rowId xmlns:a16="http://schemas.microsoft.com/office/drawing/2014/main" val="4184681860"/>
+                  </a:ext>
+                </a:extLst>
+              </a:tr>
+            </a:tbl>
+          </a:graphicData>
+        </a:graphic>
+      </p:graphicFrame>
+      <p:cxnSp>
+        <p:nvCxnSpPr>
+          <p:cNvPr id="31" name="Connector: Elbow 30">
+            <a:extLst>
+              <a:ext uri="{FF2B5EF4-FFF2-40B4-BE49-F238E27FC236}">
+                <a16:creationId xmlns:a16="http://schemas.microsoft.com/office/drawing/2014/main" id="{CB6B9D44-B2BE-46B6-9123-70867BB141F2}"/>
+              </a:ext>
+            </a:extLst>
+          </p:cNvPr>
+          <p:cNvCxnSpPr>
+            <a:cxnSpLocks/>
+            <a:stCxn id="8" idx="2"/>
+            <a:endCxn id="27" idx="0"/>
+          </p:cNvCxnSpPr>
+          <p:nvPr/>
+        </p:nvCxnSpPr>
+        <p:spPr>
+          <a:xfrm rot="5400000">
+            <a:off x="6712058" y="3944066"/>
+            <a:ext cx="1313134" cy="1054284"/>
+          </a:xfrm>
+          <a:prstGeom prst="bentConnector3">
+            <a:avLst>
+              <a:gd name="adj1" fmla="val 50000"/>
+            </a:avLst>
+          </a:prstGeom>
+          <a:ln>
+            <a:solidFill>
+              <a:schemeClr val="tx1"/>
+            </a:solidFill>
+            <a:prstDash val="dash"/>
+            <a:tailEnd type="triangle"/>
+          </a:ln>
+        </p:spPr>
+        <p:style>
+          <a:lnRef idx="2">
+            <a:schemeClr val="accent1"/>
+          </a:lnRef>
+          <a:fillRef idx="0">
+            <a:schemeClr val="accent1"/>
+          </a:fillRef>
+          <a:effectRef idx="1">
+            <a:schemeClr val="accent1"/>
+          </a:effectRef>
+          <a:fontRef idx="minor">
+            <a:schemeClr val="tx1"/>
+          </a:fontRef>
+        </p:style>
+      </p:cxnSp>
+      <p:cxnSp>
+        <p:nvCxnSpPr>
+          <p:cNvPr id="33" name="Connector: Elbow 32">
+            <a:extLst>
+              <a:ext uri="{FF2B5EF4-FFF2-40B4-BE49-F238E27FC236}">
+                <a16:creationId xmlns:a16="http://schemas.microsoft.com/office/drawing/2014/main" id="{F1250454-6004-4961-8835-40431CF34BFB}"/>
+              </a:ext>
+            </a:extLst>
+          </p:cNvPr>
+          <p:cNvCxnSpPr>
+            <a:cxnSpLocks/>
+            <a:stCxn id="7" idx="2"/>
+            <a:endCxn id="27" idx="3"/>
+          </p:cNvCxnSpPr>
+          <p:nvPr/>
+        </p:nvCxnSpPr>
+        <p:spPr>
+          <a:xfrm rot="5400000">
+            <a:off x="8563074" y="4667687"/>
+            <a:ext cx="1192138" cy="1790518"/>
+          </a:xfrm>
+          <a:prstGeom prst="bentConnector2">
+            <a:avLst/>
+          </a:prstGeom>
+          <a:ln>
+            <a:solidFill>
+              <a:schemeClr val="tx1"/>
+            </a:solidFill>
+            <a:prstDash val="dash"/>
+            <a:tailEnd type="triangle"/>
+          </a:ln>
+        </p:spPr>
+        <p:style>
+          <a:lnRef idx="2">
+            <a:schemeClr val="accent1"/>
+          </a:lnRef>
+          <a:fillRef idx="0">
+            <a:schemeClr val="accent1"/>
+          </a:fillRef>
+          <a:effectRef idx="1">
+            <a:schemeClr val="accent1"/>
+          </a:effectRef>
+          <a:fontRef idx="minor">
+            <a:schemeClr val="tx1"/>
+          </a:fontRef>
+        </p:style>
+      </p:cxnSp>
+      <p:cxnSp>
+        <p:nvCxnSpPr>
+          <p:cNvPr id="42" name="Connector: Elbow 41">
+            <a:extLst>
+              <a:ext uri="{FF2B5EF4-FFF2-40B4-BE49-F238E27FC236}">
+                <a16:creationId xmlns:a16="http://schemas.microsoft.com/office/drawing/2014/main" id="{CFC0E0DA-05D8-4288-BB87-D4DB7B0A1232}"/>
+              </a:ext>
+            </a:extLst>
+          </p:cNvPr>
+          <p:cNvCxnSpPr>
+            <a:cxnSpLocks/>
+            <a:stCxn id="7" idx="2"/>
+            <a:endCxn id="28" idx="1"/>
+          </p:cNvCxnSpPr>
+          <p:nvPr/>
+        </p:nvCxnSpPr>
+        <p:spPr>
+          <a:xfrm rot="16200000" flipH="1">
+            <a:off x="9630510" y="5390768"/>
+            <a:ext cx="1562978" cy="715195"/>
+          </a:xfrm>
+          <a:prstGeom prst="bentConnector2">
+            <a:avLst/>
+          </a:prstGeom>
+          <a:ln>
+            <a:solidFill>
+              <a:schemeClr val="tx1"/>
+            </a:solidFill>
+            <a:prstDash val="dash"/>
+            <a:tailEnd type="triangle"/>
+          </a:ln>
+        </p:spPr>
+        <p:style>
+          <a:lnRef idx="2">
+            <a:schemeClr val="accent1"/>
+          </a:lnRef>
+          <a:fillRef idx="0">
+            <a:schemeClr val="accent1"/>
+          </a:fillRef>
+          <a:effectRef idx="1">
+            <a:schemeClr val="accent1"/>
+          </a:effectRef>
+          <a:fontRef idx="minor">
+            <a:schemeClr val="tx1"/>
+          </a:fontRef>
+        </p:style>
+      </p:cxnSp>
+      <p:cxnSp>
+        <p:nvCxnSpPr>
+          <p:cNvPr id="45" name="Connector: Elbow 44">
+            <a:extLst>
+              <a:ext uri="{FF2B5EF4-FFF2-40B4-BE49-F238E27FC236}">
+                <a16:creationId xmlns:a16="http://schemas.microsoft.com/office/drawing/2014/main" id="{E8D9EE46-6779-490C-8A28-08FA8C558B72}"/>
+              </a:ext>
+            </a:extLst>
+          </p:cNvPr>
+          <p:cNvCxnSpPr>
+            <a:cxnSpLocks/>
+            <a:stCxn id="6" idx="2"/>
+            <a:endCxn id="28" idx="0"/>
+          </p:cNvCxnSpPr>
+          <p:nvPr/>
+        </p:nvCxnSpPr>
+        <p:spPr>
+          <a:xfrm rot="16200000" flipH="1">
+            <a:off x="11126883" y="4804341"/>
+            <a:ext cx="2122970" cy="7257"/>
+          </a:xfrm>
+          <a:prstGeom prst="bentConnector3">
+            <a:avLst>
+              <a:gd name="adj1" fmla="val 50000"/>
+            </a:avLst>
+          </a:prstGeom>
+          <a:ln>
+            <a:solidFill>
+              <a:schemeClr val="tx1"/>
+            </a:solidFill>
+            <a:prstDash val="dash"/>
+            <a:tailEnd type="triangle"/>
+          </a:ln>
+        </p:spPr>
+        <p:style>
+          <a:lnRef idx="2">
+            <a:schemeClr val="accent1"/>
+          </a:lnRef>
+          <a:fillRef idx="0">
+            <a:schemeClr val="accent1"/>
+          </a:fillRef>
+          <a:effectRef idx="1">
+            <a:schemeClr val="accent1"/>
+          </a:effectRef>
+          <a:fontRef idx="minor">
+            <a:schemeClr val="tx1"/>
+          </a:fontRef>
+        </p:style>
+      </p:cxnSp>
+    </p:spTree>
+    <p:extLst>
+      <p:ext uri="{BB962C8B-B14F-4D97-AF65-F5344CB8AC3E}">
+        <p14:creationId xmlns:p14="http://schemas.microsoft.com/office/powerpoint/2010/main" val="2271096865"/>
+      </p:ext>
+    </p:extLst>
+  </p:cSld>
+  <p:clrMapOvr>
+    <a:masterClrMapping/>
+  </p:clrMapOvr>
+  <p:transition>
+    <p:fade/>
+  </p:transition>
+</p:sld>
+</file>
+
+<file path=ppt/slides/slide4.xml><?xml version="1.0" encoding="utf-8"?>
+<p:sld xmlns:a="http://schemas.openxmlformats.org/drawingml/2006/main" xmlns:r="http://schemas.openxmlformats.org/officeDocument/2006/relationships" xmlns:p="http://schemas.openxmlformats.org/presentationml/2006/main">
+  <p:cSld>
+    <p:spTree>
+      <p:nvGrpSpPr>
+        <p:cNvPr id="1" name=""/>
+        <p:cNvGrpSpPr/>
+        <p:nvPr/>
+      </p:nvGrpSpPr>
+      <p:grpSpPr>
+        <a:xfrm>
+          <a:off x="0" y="0"/>
+          <a:ext cx="0" cy="0"/>
+          <a:chOff x="0" y="0"/>
+          <a:chExt cx="0" cy="0"/>
+        </a:xfrm>
+      </p:grpSpPr>
+      <p:sp>
+        <p:nvSpPr>
+          <p:cNvPr id="4" name="Title 3">
+            <a:extLst>
+              <a:ext uri="{FF2B5EF4-FFF2-40B4-BE49-F238E27FC236}">
                 <a16:creationId xmlns:a16="http://schemas.microsoft.com/office/drawing/2014/main" id="{22CC9ECA-65DA-224F-86E0-1627A6BF63EA}"/>
               </a:ext>
             </a:extLst>
@@ -7118,7 +9269,7 @@
 </p:sld>
 </file>
 
-<file path=ppt/slides/slide3.xml><?xml version="1.0" encoding="utf-8"?>
+<file path=ppt/slides/slide5.xml><?xml version="1.0" encoding="utf-8"?>
 <p:sld xmlns:a="http://schemas.openxmlformats.org/drawingml/2006/main" xmlns:r="http://schemas.openxmlformats.org/officeDocument/2006/relationships" xmlns:p="http://schemas.openxmlformats.org/presentationml/2006/main">
   <p:cSld>
     <p:spTree>
@@ -7140,7 +9291,7 @@
           <p:cNvPr id="2" name="Title 1">
             <a:extLst>
               <a:ext uri="{FF2B5EF4-FFF2-40B4-BE49-F238E27FC236}">
-                <a16:creationId xmlns:a16="http://schemas.microsoft.com/office/drawing/2014/main" id="{9B5C81A3-B1BF-9F4C-8EEE-F32AC4C19436}"/>
+                <a16:creationId xmlns:a16="http://schemas.microsoft.com/office/drawing/2014/main" id="{8789B27C-E0F0-42D2-9DF3-0D0BE894FA88}"/>
               </a:ext>
             </a:extLst>
           </p:cNvPr>
@@ -7151,21 +9302,14 @@
             <p:ph type="title"/>
           </p:nvPr>
         </p:nvSpPr>
-        <p:spPr>
-          <a:xfrm>
-            <a:off x="630308" y="906262"/>
-            <a:ext cx="5435212" cy="1661993"/>
-          </a:xfrm>
-        </p:spPr>
+        <p:spPr/>
         <p:txBody>
-          <a:bodyPr anchor="t">
-            <a:normAutofit/>
-          </a:bodyPr>
+          <a:bodyPr/>
           <a:lstStyle/>
           <a:p>
             <a:r>
               <a:rPr lang="en-US" dirty="0"/>
-              <a:t>Inheriting methods</a:t>
+              <a:t>Practice</a:t>
             </a:r>
           </a:p>
         </p:txBody>
@@ -7175,7 +9319,7 @@
           <p:cNvPr id="3" name="Text Placeholder 2">
             <a:extLst>
               <a:ext uri="{FF2B5EF4-FFF2-40B4-BE49-F238E27FC236}">
-                <a16:creationId xmlns:a16="http://schemas.microsoft.com/office/drawing/2014/main" id="{BF7213E6-44C8-9D49-9589-8A1366312D8A}"/>
+                <a16:creationId xmlns:a16="http://schemas.microsoft.com/office/drawing/2014/main" id="{F6031714-7207-4979-BE11-76B2448AA18A}"/>
               </a:ext>
             </a:extLst>
           </p:cNvPr>
@@ -7183,163 +9327,105 @@
             <a:spLocks noGrp="1"/>
           </p:cNvSpPr>
           <p:nvPr>
-            <p:ph idx="1"/>
+            <p:ph type="body" sz="quarter" idx="10"/>
           </p:nvPr>
         </p:nvSpPr>
         <p:spPr>
           <a:xfrm>
-            <a:off x="630308" y="2004319"/>
-            <a:ext cx="5740012" cy="5249921"/>
+            <a:off x="628075" y="1776683"/>
+            <a:ext cx="12561453" cy="4323299"/>
           </a:xfrm>
         </p:spPr>
         <p:txBody>
-          <a:bodyPr>
-            <a:normAutofit fontScale="92500" lnSpcReduction="20000"/>
-          </a:bodyPr>
+          <a:bodyPr/>
           <a:lstStyle/>
           <a:p>
             <a:r>
               <a:rPr lang="en-US" dirty="0"/>
-              <a:t>Given this example, what methods are available to Tiger?</a:t>
+              <a:t>In your main class</a:t>
             </a:r>
           </a:p>
           <a:p>
             <a:pPr lvl="1"/>
             <a:r>
+              <a:rPr lang="en-US" dirty="0"/>
+              <a:t>Write a method that takes in two objects</a:t>
+            </a:r>
+          </a:p>
+          <a:p>
+            <a:pPr lvl="2"/>
+            <a:r>
+              <a:rPr lang="en-US" dirty="0"/>
+              <a:t>The objects should have a .</a:t>
+            </a:r>
+            <a:r>
               <a:rPr lang="en-US" dirty="0" err="1"/>
-              <a:t>getSound</a:t>
-            </a:r>
+              <a:t>getWidth</a:t>
+            </a:r>
+            <a:r>
+              <a:rPr lang="en-US" dirty="0"/>
+              <a:t>() method</a:t>
+            </a:r>
+          </a:p>
+          <a:p>
+            <a:pPr lvl="3"/>
+            <a:r>
+              <a:rPr lang="en-US" dirty="0"/>
+              <a:t>(what type??)</a:t>
+            </a:r>
+          </a:p>
+          <a:p>
+            <a:pPr lvl="2"/>
+            <a:r>
+              <a:rPr lang="en-US" dirty="0"/>
+              <a:t>Returns -1 if the first is narrower than the second, 0 if equal, 1 if larger</a:t>
+            </a:r>
+          </a:p>
+          <a:p>
+            <a:r>
+              <a:rPr lang="en-US" dirty="0"/>
+              <a:t>Loop through your Array, comparing the first object to every object after it that has a width</a:t>
+            </a:r>
+          </a:p>
+          <a:p>
+            <a:pPr lvl="1"/>
+            <a:r>
+              <a:rPr lang="en-US" dirty="0"/>
+              <a:t>Print out the result</a:t>
+            </a:r>
+          </a:p>
+          <a:p>
+            <a:pPr lvl="1"/>
+            <a:r>
+              <a:rPr lang="en-US" dirty="0"/>
+              <a:t>Can you do it, so all objects are compared to each other (loop with a loop)</a:t>
+            </a:r>
+          </a:p>
+          <a:p>
+            <a:pPr lvl="1"/>
             <a:endParaRPr lang="en-US" dirty="0"/>
           </a:p>
           <a:p>
             <a:pPr lvl="1"/>
             <a:r>
-              <a:rPr lang="en-US" dirty="0" err="1"/>
-              <a:t>getSize</a:t>
-            </a:r>
+              <a:rPr lang="en-US" b="1" dirty="0" err="1"/>
+              <a:t>instanceOf</a:t>
+            </a:r>
+            <a:r>
+              <a:rPr lang="en-US" dirty="0"/>
+              <a:t> will help you!</a:t>
+            </a:r>
+          </a:p>
+          <a:p>
+            <a:pPr lvl="1"/>
             <a:endParaRPr lang="en-US" dirty="0"/>
-          </a:p>
-          <a:p>
-            <a:pPr lvl="1"/>
-            <a:r>
-              <a:rPr lang="en-US" dirty="0" err="1"/>
-              <a:t>setSize</a:t>
-            </a:r>
-            <a:endParaRPr lang="en-US" dirty="0"/>
-          </a:p>
-          <a:p>
-            <a:pPr lvl="1"/>
-            <a:r>
-              <a:rPr lang="en-US" dirty="0" err="1"/>
-              <a:t>getHabitat</a:t>
-            </a:r>
-            <a:endParaRPr lang="en-US" dirty="0"/>
-          </a:p>
-          <a:p>
-            <a:pPr lvl="1"/>
-            <a:r>
-              <a:rPr lang="en-US" dirty="0" err="1"/>
-              <a:t>setHabitat</a:t>
-            </a:r>
-            <a:endParaRPr lang="en-US" dirty="0"/>
-          </a:p>
-          <a:p>
-            <a:pPr lvl="1"/>
-            <a:r>
-              <a:rPr lang="en-US" dirty="0" err="1"/>
-              <a:t>clawsOut</a:t>
-            </a:r>
-            <a:endParaRPr lang="en-US" dirty="0"/>
-          </a:p>
-          <a:p>
-            <a:pPr lvl="1"/>
-            <a:r>
-              <a:rPr lang="en-US" dirty="0"/>
-              <a:t>climb</a:t>
-            </a:r>
-          </a:p>
-          <a:p>
-            <a:pPr lvl="1"/>
-            <a:r>
-              <a:rPr lang="en-US" dirty="0" err="1"/>
-              <a:t>toggleClaws</a:t>
-            </a:r>
-            <a:endParaRPr lang="en-US" dirty="0"/>
-          </a:p>
-          <a:p>
-            <a:pPr lvl="1"/>
-            <a:r>
-              <a:rPr lang="en-US" dirty="0" err="1"/>
-              <a:t>canSwim</a:t>
-            </a:r>
-            <a:endParaRPr lang="en-US" dirty="0"/>
-          </a:p>
-          <a:p>
-            <a:pPr lvl="1"/>
-            <a:r>
-              <a:rPr lang="en-US" dirty="0" err="1"/>
-              <a:t>getSpeed</a:t>
-            </a:r>
-            <a:endParaRPr lang="en-US" dirty="0"/>
-          </a:p>
-          <a:p>
-            <a:pPr lvl="1"/>
-            <a:r>
-              <a:rPr lang="en-US" dirty="0" err="1"/>
-              <a:t>getStripCount</a:t>
-            </a:r>
-            <a:endParaRPr lang="en-US" dirty="0"/>
-          </a:p>
-          <a:p>
-            <a:r>
-              <a:rPr lang="en-US" dirty="0"/>
-              <a:t>Could easily add a Lion that inherits from Feline</a:t>
-            </a:r>
-          </a:p>
-          <a:p>
-            <a:pPr lvl="1"/>
-            <a:r>
-              <a:rPr lang="en-US" dirty="0"/>
-              <a:t>mostly same methods, with out the Swimmer or Stripes, but maybe unique ones on its own.</a:t>
-            </a:r>
           </a:p>
         </p:txBody>
       </p:sp>
-      <p:pic>
-        <p:nvPicPr>
-          <p:cNvPr id="4" name="Picture 3">
-            <a:extLst>
-              <a:ext uri="{FF2B5EF4-FFF2-40B4-BE49-F238E27FC236}">
-                <a16:creationId xmlns:a16="http://schemas.microsoft.com/office/drawing/2014/main" id="{64540F34-7CE3-0244-BE3B-1E63E591EDB8}"/>
-              </a:ext>
-            </a:extLst>
-          </p:cNvPr>
-          <p:cNvPicPr>
-            <a:picLocks/>
-          </p:cNvPicPr>
-          <p:nvPr/>
-        </p:nvPicPr>
-        <p:blipFill>
-          <a:blip r:embed="rId2"/>
-          <a:stretch>
-            <a:fillRect/>
-          </a:stretch>
-        </p:blipFill>
-        <p:spPr>
-          <a:xfrm>
-            <a:off x="7556104" y="662198"/>
-            <a:ext cx="4853948" cy="5848130"/>
-          </a:xfrm>
-          <a:prstGeom prst="rect">
-            <a:avLst/>
-          </a:prstGeom>
-          <a:noFill/>
-        </p:spPr>
-      </p:pic>
     </p:spTree>
     <p:extLst>
       <p:ext uri="{BB962C8B-B14F-4D97-AF65-F5344CB8AC3E}">
-        <p14:creationId xmlns:p14="http://schemas.microsoft.com/office/powerpoint/2010/main" val="4018090737"/>
+        <p14:creationId xmlns:p14="http://schemas.microsoft.com/office/powerpoint/2010/main" val="2485593931"/>
       </p:ext>
     </p:extLst>
   </p:cSld>
@@ -7361,7 +9447,157 @@
 </p:sld>
 </file>
 
-<file path=ppt/slides/slide4.xml><?xml version="1.0" encoding="utf-8"?>
+<file path=ppt/slides/slide6.xml><?xml version="1.0" encoding="utf-8"?>
+<p:sld xmlns:a="http://schemas.openxmlformats.org/drawingml/2006/main" xmlns:r="http://schemas.openxmlformats.org/officeDocument/2006/relationships" xmlns:p="http://schemas.openxmlformats.org/presentationml/2006/main">
+  <p:cSld>
+    <p:spTree>
+      <p:nvGrpSpPr>
+        <p:cNvPr id="1" name=""/>
+        <p:cNvGrpSpPr/>
+        <p:nvPr/>
+      </p:nvGrpSpPr>
+      <p:grpSpPr>
+        <a:xfrm>
+          <a:off x="0" y="0"/>
+          <a:ext cx="0" cy="0"/>
+          <a:chOff x="0" y="0"/>
+          <a:chExt cx="0" cy="0"/>
+        </a:xfrm>
+      </p:grpSpPr>
+      <p:sp>
+        <p:nvSpPr>
+          <p:cNvPr id="2" name="Title 1">
+            <a:extLst>
+              <a:ext uri="{FF2B5EF4-FFF2-40B4-BE49-F238E27FC236}">
+                <a16:creationId xmlns:a16="http://schemas.microsoft.com/office/drawing/2014/main" id="{6B1B8DC6-6F2C-4C39-99FE-C6A904766B34}"/>
+              </a:ext>
+            </a:extLst>
+          </p:cNvPr>
+          <p:cNvSpPr>
+            <a:spLocks noGrp="1"/>
+          </p:cNvSpPr>
+          <p:nvPr>
+            <p:ph type="title"/>
+          </p:nvPr>
+        </p:nvSpPr>
+        <p:spPr/>
+        <p:txBody>
+          <a:bodyPr/>
+          <a:lstStyle/>
+          <a:p>
+            <a:r>
+              <a:rPr lang="en-US"/>
+              <a:t>Practice – Next Step</a:t>
+            </a:r>
+            <a:endParaRPr lang="en-US" dirty="0"/>
+          </a:p>
+        </p:txBody>
+      </p:sp>
+      <p:sp>
+        <p:nvSpPr>
+          <p:cNvPr id="3" name="Text Placeholder 2">
+            <a:extLst>
+              <a:ext uri="{FF2B5EF4-FFF2-40B4-BE49-F238E27FC236}">
+                <a16:creationId xmlns:a16="http://schemas.microsoft.com/office/drawing/2014/main" id="{B7DF252D-B0B9-45EE-A76C-E9260A712A7D}"/>
+              </a:ext>
+            </a:extLst>
+          </p:cNvPr>
+          <p:cNvSpPr>
+            <a:spLocks noGrp="1"/>
+          </p:cNvSpPr>
+          <p:nvPr>
+            <p:ph type="body" sz="quarter" idx="10"/>
+          </p:nvPr>
+        </p:nvSpPr>
+        <p:spPr>
+          <a:xfrm>
+            <a:off x="628075" y="1776683"/>
+            <a:ext cx="12561453" cy="2571217"/>
+          </a:xfrm>
+        </p:spPr>
+        <p:txBody>
+          <a:bodyPr/>
+          <a:lstStyle/>
+          <a:p>
+            <a:r>
+              <a:rPr lang="en-US" dirty="0"/>
+              <a:t>Colorblindness is a major concern! </a:t>
+            </a:r>
+          </a:p>
+          <a:p>
+            <a:r>
+              <a:rPr lang="en-US" dirty="0"/>
+              <a:t>Write an </a:t>
+            </a:r>
+            <a:r>
+              <a:rPr lang="en-US" dirty="0" err="1"/>
+              <a:t>id_protanopia</a:t>
+            </a:r>
+            <a:r>
+              <a:rPr lang="en-US" dirty="0"/>
+              <a:t> method</a:t>
+            </a:r>
+          </a:p>
+          <a:p>
+            <a:pPr lvl="1"/>
+            <a:r>
+              <a:rPr lang="en-US" dirty="0"/>
+              <a:t>Takes in any object that has a color value</a:t>
+            </a:r>
+          </a:p>
+          <a:p>
+            <a:pPr lvl="1"/>
+            <a:r>
+              <a:rPr lang="en-US" dirty="0"/>
+              <a:t>If the Red value is below 64, returns true</a:t>
+            </a:r>
+          </a:p>
+          <a:p>
+            <a:pPr lvl="1"/>
+            <a:r>
+              <a:rPr lang="en-US" dirty="0"/>
+              <a:t>Else returns false</a:t>
+            </a:r>
+          </a:p>
+          <a:p>
+            <a:r>
+              <a:rPr lang="en-US" dirty="0"/>
+              <a:t>Count the number of objects in your array list that have a color, and have </a:t>
+            </a:r>
+            <a:r>
+              <a:rPr lang="en-US" dirty="0" err="1"/>
+              <a:t>id_protanopia</a:t>
+            </a:r>
+            <a:endParaRPr lang="en-US" dirty="0"/>
+          </a:p>
+        </p:txBody>
+      </p:sp>
+    </p:spTree>
+    <p:extLst>
+      <p:ext uri="{BB962C8B-B14F-4D97-AF65-F5344CB8AC3E}">
+        <p14:creationId xmlns:p14="http://schemas.microsoft.com/office/powerpoint/2010/main" val="147901335"/>
+      </p:ext>
+    </p:extLst>
+  </p:cSld>
+  <p:clrMapOvr>
+    <a:masterClrMapping/>
+  </p:clrMapOvr>
+  <mc:AlternateContent xmlns:mc="http://schemas.openxmlformats.org/markup-compatibility/2006" xmlns:p14="http://schemas.microsoft.com/office/powerpoint/2010/main">
+    <mc:Choice Requires="p14">
+      <p:transition p14:dur="300">
+        <p:fade/>
+      </p:transition>
+    </mc:Choice>
+    <mc:Fallback xmlns="">
+      <p:transition>
+        <p:fade/>
+      </p:transition>
+    </mc:Fallback>
+  </mc:AlternateContent>
+</p:sld>
+</file>
+
+<file path=ppt/slides/slide7.xml><?xml version="1.0" encoding="utf-8"?>
 <p:sld xmlns:a="http://schemas.openxmlformats.org/drawingml/2006/main" xmlns:r="http://schemas.openxmlformats.org/officeDocument/2006/relationships" xmlns:p="http://schemas.openxmlformats.org/presentationml/2006/main">
   <p:cSld>
     <p:spTree>
@@ -7724,7 +9960,7 @@
 </p:sld>
 </file>
 
-<file path=ppt/slides/slide5.xml><?xml version="1.0" encoding="utf-8"?>
+<file path=ppt/slides/slide8.xml><?xml version="1.0" encoding="utf-8"?>
 <p:sld xmlns:a="http://schemas.openxmlformats.org/drawingml/2006/main" xmlns:r="http://schemas.openxmlformats.org/officeDocument/2006/relationships" xmlns:p="http://schemas.openxmlformats.org/presentationml/2006/main">
   <p:cSld>
     <p:spTree>
@@ -7904,6 +10140,249 @@
       </p:transition>
     </mc:Choice>
     <mc:Fallback xmlns="">
+      <p:transition>
+        <p:fade/>
+      </p:transition>
+    </mc:Fallback>
+  </mc:AlternateContent>
+</p:sld>
+</file>
+
+<file path=ppt/slides/slide9.xml><?xml version="1.0" encoding="utf-8"?>
+<p:sld xmlns:a="http://schemas.openxmlformats.org/drawingml/2006/main" xmlns:r="http://schemas.openxmlformats.org/officeDocument/2006/relationships" xmlns:p="http://schemas.openxmlformats.org/presentationml/2006/main" show="0">
+  <p:cSld>
+    <p:spTree>
+      <p:nvGrpSpPr>
+        <p:cNvPr id="1" name=""/>
+        <p:cNvGrpSpPr/>
+        <p:nvPr/>
+      </p:nvGrpSpPr>
+      <p:grpSpPr>
+        <a:xfrm>
+          <a:off x="0" y="0"/>
+          <a:ext cx="0" cy="0"/>
+          <a:chOff x="0" y="0"/>
+          <a:chExt cx="0" cy="0"/>
+        </a:xfrm>
+      </p:grpSpPr>
+      <p:sp>
+        <p:nvSpPr>
+          <p:cNvPr id="2" name="Title 1">
+            <a:extLst>
+              <a:ext uri="{FF2B5EF4-FFF2-40B4-BE49-F238E27FC236}">
+                <a16:creationId xmlns:a16="http://schemas.microsoft.com/office/drawing/2014/main" id="{9B5C81A3-B1BF-9F4C-8EEE-F32AC4C19436}"/>
+              </a:ext>
+            </a:extLst>
+          </p:cNvPr>
+          <p:cNvSpPr>
+            <a:spLocks noGrp="1"/>
+          </p:cNvSpPr>
+          <p:nvPr>
+            <p:ph type="title"/>
+          </p:nvPr>
+        </p:nvSpPr>
+        <p:spPr>
+          <a:xfrm>
+            <a:off x="630308" y="906262"/>
+            <a:ext cx="5435212" cy="1661993"/>
+          </a:xfrm>
+        </p:spPr>
+        <p:txBody>
+          <a:bodyPr anchor="t">
+            <a:normAutofit/>
+          </a:bodyPr>
+          <a:lstStyle/>
+          <a:p>
+            <a:r>
+              <a:rPr lang="en-US" dirty="0"/>
+              <a:t>Inheriting methods</a:t>
+            </a:r>
+          </a:p>
+        </p:txBody>
+      </p:sp>
+      <p:sp>
+        <p:nvSpPr>
+          <p:cNvPr id="3" name="Text Placeholder 2">
+            <a:extLst>
+              <a:ext uri="{FF2B5EF4-FFF2-40B4-BE49-F238E27FC236}">
+                <a16:creationId xmlns:a16="http://schemas.microsoft.com/office/drawing/2014/main" id="{BF7213E6-44C8-9D49-9589-8A1366312D8A}"/>
+              </a:ext>
+            </a:extLst>
+          </p:cNvPr>
+          <p:cNvSpPr>
+            <a:spLocks noGrp="1"/>
+          </p:cNvSpPr>
+          <p:nvPr>
+            <p:ph idx="1"/>
+          </p:nvPr>
+        </p:nvSpPr>
+        <p:spPr>
+          <a:xfrm>
+            <a:off x="630308" y="2004319"/>
+            <a:ext cx="5740012" cy="5249921"/>
+          </a:xfrm>
+        </p:spPr>
+        <p:txBody>
+          <a:bodyPr>
+            <a:normAutofit fontScale="92500" lnSpcReduction="20000"/>
+          </a:bodyPr>
+          <a:lstStyle/>
+          <a:p>
+            <a:r>
+              <a:rPr lang="en-US" dirty="0"/>
+              <a:t>Given this example, what methods are available to Tiger?</a:t>
+            </a:r>
+          </a:p>
+          <a:p>
+            <a:pPr lvl="1"/>
+            <a:r>
+              <a:rPr lang="en-US" dirty="0" err="1"/>
+              <a:t>getSound</a:t>
+            </a:r>
+            <a:endParaRPr lang="en-US" dirty="0"/>
+          </a:p>
+          <a:p>
+            <a:pPr lvl="1"/>
+            <a:r>
+              <a:rPr lang="en-US" dirty="0" err="1"/>
+              <a:t>getSize</a:t>
+            </a:r>
+            <a:endParaRPr lang="en-US" dirty="0"/>
+          </a:p>
+          <a:p>
+            <a:pPr lvl="1"/>
+            <a:r>
+              <a:rPr lang="en-US" dirty="0" err="1"/>
+              <a:t>setSize</a:t>
+            </a:r>
+            <a:endParaRPr lang="en-US" dirty="0"/>
+          </a:p>
+          <a:p>
+            <a:pPr lvl="1"/>
+            <a:r>
+              <a:rPr lang="en-US" dirty="0" err="1"/>
+              <a:t>getHabitat</a:t>
+            </a:r>
+            <a:endParaRPr lang="en-US" dirty="0"/>
+          </a:p>
+          <a:p>
+            <a:pPr lvl="1"/>
+            <a:r>
+              <a:rPr lang="en-US" dirty="0" err="1"/>
+              <a:t>setHabitat</a:t>
+            </a:r>
+            <a:endParaRPr lang="en-US" dirty="0"/>
+          </a:p>
+          <a:p>
+            <a:pPr lvl="1"/>
+            <a:r>
+              <a:rPr lang="en-US" dirty="0" err="1"/>
+              <a:t>clawsOut</a:t>
+            </a:r>
+            <a:endParaRPr lang="en-US" dirty="0"/>
+          </a:p>
+          <a:p>
+            <a:pPr lvl="1"/>
+            <a:r>
+              <a:rPr lang="en-US" dirty="0"/>
+              <a:t>climb</a:t>
+            </a:r>
+          </a:p>
+          <a:p>
+            <a:pPr lvl="1"/>
+            <a:r>
+              <a:rPr lang="en-US" dirty="0" err="1"/>
+              <a:t>toggleClaws</a:t>
+            </a:r>
+            <a:endParaRPr lang="en-US" dirty="0"/>
+          </a:p>
+          <a:p>
+            <a:pPr lvl="1"/>
+            <a:r>
+              <a:rPr lang="en-US" dirty="0" err="1"/>
+              <a:t>canSwim</a:t>
+            </a:r>
+            <a:endParaRPr lang="en-US" dirty="0"/>
+          </a:p>
+          <a:p>
+            <a:pPr lvl="1"/>
+            <a:r>
+              <a:rPr lang="en-US" dirty="0" err="1"/>
+              <a:t>getSpeed</a:t>
+            </a:r>
+            <a:endParaRPr lang="en-US" dirty="0"/>
+          </a:p>
+          <a:p>
+            <a:pPr lvl="1"/>
+            <a:r>
+              <a:rPr lang="en-US" dirty="0" err="1"/>
+              <a:t>getStripCount</a:t>
+            </a:r>
+            <a:endParaRPr lang="en-US" dirty="0"/>
+          </a:p>
+          <a:p>
+            <a:r>
+              <a:rPr lang="en-US" dirty="0"/>
+              <a:t>Could easily add a Lion that inherits from Feline</a:t>
+            </a:r>
+          </a:p>
+          <a:p>
+            <a:pPr lvl="1"/>
+            <a:r>
+              <a:rPr lang="en-US" dirty="0"/>
+              <a:t>mostly same methods, with out the Swimmer or Stripes, but maybe unique ones on its own.</a:t>
+            </a:r>
+          </a:p>
+        </p:txBody>
+      </p:sp>
+      <p:pic>
+        <p:nvPicPr>
+          <p:cNvPr id="4" name="Picture 3">
+            <a:extLst>
+              <a:ext uri="{FF2B5EF4-FFF2-40B4-BE49-F238E27FC236}">
+                <a16:creationId xmlns:a16="http://schemas.microsoft.com/office/drawing/2014/main" id="{64540F34-7CE3-0244-BE3B-1E63E591EDB8}"/>
+              </a:ext>
+            </a:extLst>
+          </p:cNvPr>
+          <p:cNvPicPr>
+            <a:picLocks/>
+          </p:cNvPicPr>
+          <p:nvPr/>
+        </p:nvPicPr>
+        <p:blipFill>
+          <a:blip r:embed="rId2"/>
+          <a:stretch>
+            <a:fillRect/>
+          </a:stretch>
+        </p:blipFill>
+        <p:spPr>
+          <a:xfrm>
+            <a:off x="7556104" y="662198"/>
+            <a:ext cx="4853948" cy="5848130"/>
+          </a:xfrm>
+          <a:prstGeom prst="rect">
+            <a:avLst/>
+          </a:prstGeom>
+          <a:noFill/>
+        </p:spPr>
+      </p:pic>
+    </p:spTree>
+    <p:extLst>
+      <p:ext uri="{BB962C8B-B14F-4D97-AF65-F5344CB8AC3E}">
+        <p14:creationId xmlns:p14="http://schemas.microsoft.com/office/powerpoint/2010/main" val="4018090737"/>
+      </p:ext>
+    </p:extLst>
+  </p:cSld>
+  <p:clrMapOvr>
+    <a:masterClrMapping/>
+  </p:clrMapOvr>
+  <mc:AlternateContent xmlns:mc="http://schemas.openxmlformats.org/markup-compatibility/2006">
+    <mc:Choice xmlns:p14="http://schemas.microsoft.com/office/powerpoint/2010/main" Requires="p14">
+      <p:transition p14:dur="300">
+        <p:fade/>
+      </p:transition>
+    </mc:Choice>
+    <mc:Fallback>
       <p:transition>
         <p:fade/>
       </p:transition>

</xml_diff>